<commit_message>
Added cover slide to weekly progress PPT
</commit_message>
<xml_diff>
--- a/weekly_progress.pptx
+++ b/weekly_progress.pptx
@@ -4,8 +4,12 @@
   <p:sldMasterIdLst>
     <p:sldMasterId id="2147483648" r:id="rId1"/>
   </p:sldMasterIdLst>
+  <p:notesMasterIdLst>
+    <p:notesMasterId r:id="rId4"/>
+  </p:notesMasterIdLst>
   <p:sldIdLst>
     <p:sldId id="256" r:id="rId2"/>
+    <p:sldId id="257" r:id="rId3"/>
   </p:sldIdLst>
   <p:sldSz cx="12192000" cy="6858000"/>
   <p:notesSz cx="6858000" cy="9144000"/>
@@ -104,7 +108,445 @@
       </a:defRPr>
     </a:lvl9pPr>
   </p:defaultTextStyle>
+  <p:extLst>
+    <p:ext uri="{EFAFB233-063F-42B5-8137-9DF3F51BA10A}">
+      <p15:sldGuideLst xmlns:p15="http://schemas.microsoft.com/office/powerpoint/2012/main"/>
+    </p:ext>
+  </p:extLst>
 </p:presentation>
+</file>
+
+<file path=ppt/notesMasters/notesMaster1.xml><?xml version="1.0" encoding="utf-8"?>
+<p:notesMaster xmlns:a="http://schemas.openxmlformats.org/drawingml/2006/main" xmlns:r="http://schemas.openxmlformats.org/officeDocument/2006/relationships" xmlns:p="http://schemas.openxmlformats.org/presentationml/2006/main">
+  <p:cSld>
+    <p:bg>
+      <p:bgRef idx="1001">
+        <a:schemeClr val="bg1"/>
+      </p:bgRef>
+    </p:bg>
+    <p:spTree>
+      <p:nvGrpSpPr>
+        <p:cNvPr id="1" name=""/>
+        <p:cNvGrpSpPr/>
+        <p:nvPr/>
+      </p:nvGrpSpPr>
+      <p:grpSpPr>
+        <a:xfrm>
+          <a:off x="0" y="0"/>
+          <a:ext cx="0" cy="0"/>
+          <a:chOff x="0" y="0"/>
+          <a:chExt cx="0" cy="0"/>
+        </a:xfrm>
+      </p:grpSpPr>
+      <p:sp>
+        <p:nvSpPr>
+          <p:cNvPr id="2" name="Header Placeholder 1"/>
+          <p:cNvSpPr>
+            <a:spLocks noGrp="1"/>
+          </p:cNvSpPr>
+          <p:nvPr>
+            <p:ph type="hdr" sz="quarter"/>
+          </p:nvPr>
+        </p:nvSpPr>
+        <p:spPr>
+          <a:xfrm>
+            <a:off x="0" y="0"/>
+            <a:ext cx="2971800" cy="458788"/>
+          </a:xfrm>
+          <a:prstGeom prst="rect">
+            <a:avLst/>
+          </a:prstGeom>
+        </p:spPr>
+        <p:txBody>
+          <a:bodyPr vert="horz" lIns="91440" tIns="45720" rIns="91440" bIns="45720" rtlCol="0"/>
+          <a:lstStyle>
+            <a:lvl1pPr algn="l">
+              <a:defRPr sz="1200"/>
+            </a:lvl1pPr>
+          </a:lstStyle>
+          <a:p>
+            <a:endParaRPr lang="en-US"/>
+          </a:p>
+        </p:txBody>
+      </p:sp>
+      <p:sp>
+        <p:nvSpPr>
+          <p:cNvPr id="3" name="Date Placeholder 2"/>
+          <p:cNvSpPr>
+            <a:spLocks noGrp="1"/>
+          </p:cNvSpPr>
+          <p:nvPr>
+            <p:ph type="dt" idx="1"/>
+          </p:nvPr>
+        </p:nvSpPr>
+        <p:spPr>
+          <a:xfrm>
+            <a:off x="3884613" y="0"/>
+            <a:ext cx="2971800" cy="458788"/>
+          </a:xfrm>
+          <a:prstGeom prst="rect">
+            <a:avLst/>
+          </a:prstGeom>
+        </p:spPr>
+        <p:txBody>
+          <a:bodyPr vert="horz" lIns="91440" tIns="45720" rIns="91440" bIns="45720" rtlCol="0"/>
+          <a:lstStyle>
+            <a:lvl1pPr algn="r">
+              <a:defRPr sz="1200"/>
+            </a:lvl1pPr>
+          </a:lstStyle>
+          <a:p>
+            <a:fld id="{BF3B6487-623F-5144-817D-0678D4F16A76}" type="datetimeFigureOut">
+              <a:rPr lang="en-US" smtClean="0"/>
+              <a:t>11/1/23</a:t>
+            </a:fld>
+            <a:endParaRPr lang="en-US"/>
+          </a:p>
+        </p:txBody>
+      </p:sp>
+      <p:sp>
+        <p:nvSpPr>
+          <p:cNvPr id="4" name="Slide Image Placeholder 3"/>
+          <p:cNvSpPr>
+            <a:spLocks noGrp="1" noRot="1" noChangeAspect="1"/>
+          </p:cNvSpPr>
+          <p:nvPr>
+            <p:ph type="sldImg" idx="2"/>
+          </p:nvPr>
+        </p:nvSpPr>
+        <p:spPr>
+          <a:xfrm>
+            <a:off x="685800" y="1143000"/>
+            <a:ext cx="5486400" cy="3086100"/>
+          </a:xfrm>
+          <a:prstGeom prst="rect">
+            <a:avLst/>
+          </a:prstGeom>
+          <a:noFill/>
+          <a:ln w="12700">
+            <a:solidFill>
+              <a:prstClr val="black"/>
+            </a:solidFill>
+          </a:ln>
+        </p:spPr>
+        <p:txBody>
+          <a:bodyPr vert="horz" lIns="91440" tIns="45720" rIns="91440" bIns="45720" rtlCol="0" anchor="ctr"/>
+          <a:lstStyle/>
+          <a:p>
+            <a:endParaRPr lang="en-US"/>
+          </a:p>
+        </p:txBody>
+      </p:sp>
+      <p:sp>
+        <p:nvSpPr>
+          <p:cNvPr id="5" name="Notes Placeholder 4"/>
+          <p:cNvSpPr>
+            <a:spLocks noGrp="1"/>
+          </p:cNvSpPr>
+          <p:nvPr>
+            <p:ph type="body" sz="quarter" idx="3"/>
+          </p:nvPr>
+        </p:nvSpPr>
+        <p:spPr>
+          <a:xfrm>
+            <a:off x="685800" y="4400550"/>
+            <a:ext cx="5486400" cy="3600450"/>
+          </a:xfrm>
+          <a:prstGeom prst="rect">
+            <a:avLst/>
+          </a:prstGeom>
+        </p:spPr>
+        <p:txBody>
+          <a:bodyPr vert="horz" lIns="91440" tIns="45720" rIns="91440" bIns="45720" rtlCol="0"/>
+          <a:lstStyle/>
+          <a:p>
+            <a:pPr lvl="0"/>
+            <a:r>
+              <a:rPr lang="en-US"/>
+              <a:t>Click to edit Master text styles</a:t>
+            </a:r>
+          </a:p>
+          <a:p>
+            <a:pPr lvl="1"/>
+            <a:r>
+              <a:rPr lang="en-US"/>
+              <a:t>Second level</a:t>
+            </a:r>
+          </a:p>
+          <a:p>
+            <a:pPr lvl="2"/>
+            <a:r>
+              <a:rPr lang="en-US"/>
+              <a:t>Third level</a:t>
+            </a:r>
+          </a:p>
+          <a:p>
+            <a:pPr lvl="3"/>
+            <a:r>
+              <a:rPr lang="en-US"/>
+              <a:t>Fourth level</a:t>
+            </a:r>
+          </a:p>
+          <a:p>
+            <a:pPr lvl="4"/>
+            <a:r>
+              <a:rPr lang="en-US"/>
+              <a:t>Fifth level</a:t>
+            </a:r>
+          </a:p>
+        </p:txBody>
+      </p:sp>
+      <p:sp>
+        <p:nvSpPr>
+          <p:cNvPr id="6" name="Footer Placeholder 5"/>
+          <p:cNvSpPr>
+            <a:spLocks noGrp="1"/>
+          </p:cNvSpPr>
+          <p:nvPr>
+            <p:ph type="ftr" sz="quarter" idx="4"/>
+          </p:nvPr>
+        </p:nvSpPr>
+        <p:spPr>
+          <a:xfrm>
+            <a:off x="0" y="8685213"/>
+            <a:ext cx="2971800" cy="458787"/>
+          </a:xfrm>
+          <a:prstGeom prst="rect">
+            <a:avLst/>
+          </a:prstGeom>
+        </p:spPr>
+        <p:txBody>
+          <a:bodyPr vert="horz" lIns="91440" tIns="45720" rIns="91440" bIns="45720" rtlCol="0" anchor="b"/>
+          <a:lstStyle>
+            <a:lvl1pPr algn="l">
+              <a:defRPr sz="1200"/>
+            </a:lvl1pPr>
+          </a:lstStyle>
+          <a:p>
+            <a:endParaRPr lang="en-US"/>
+          </a:p>
+        </p:txBody>
+      </p:sp>
+      <p:sp>
+        <p:nvSpPr>
+          <p:cNvPr id="7" name="Slide Number Placeholder 6"/>
+          <p:cNvSpPr>
+            <a:spLocks noGrp="1"/>
+          </p:cNvSpPr>
+          <p:nvPr>
+            <p:ph type="sldNum" sz="quarter" idx="5"/>
+          </p:nvPr>
+        </p:nvSpPr>
+        <p:spPr>
+          <a:xfrm>
+            <a:off x="3884613" y="8685213"/>
+            <a:ext cx="2971800" cy="458787"/>
+          </a:xfrm>
+          <a:prstGeom prst="rect">
+            <a:avLst/>
+          </a:prstGeom>
+        </p:spPr>
+        <p:txBody>
+          <a:bodyPr vert="horz" lIns="91440" tIns="45720" rIns="91440" bIns="45720" rtlCol="0" anchor="b"/>
+          <a:lstStyle>
+            <a:lvl1pPr algn="r">
+              <a:defRPr sz="1200"/>
+            </a:lvl1pPr>
+          </a:lstStyle>
+          <a:p>
+            <a:fld id="{F6742F82-CB19-C049-A5F4-AD80AE78FAF2}" type="slidenum">
+              <a:rPr lang="en-US" smtClean="0"/>
+              <a:t>‹#›</a:t>
+            </a:fld>
+            <a:endParaRPr lang="en-US"/>
+          </a:p>
+        </p:txBody>
+      </p:sp>
+    </p:spTree>
+    <p:extLst>
+      <p:ext uri="{BB962C8B-B14F-4D97-AF65-F5344CB8AC3E}">
+        <p14:creationId xmlns:p14="http://schemas.microsoft.com/office/powerpoint/2010/main" val="3230086682"/>
+      </p:ext>
+    </p:extLst>
+  </p:cSld>
+  <p:clrMap bg1="lt1" tx1="dk1" bg2="lt2" tx2="dk2" accent1="accent1" accent2="accent2" accent3="accent3" accent4="accent4" accent5="accent5" accent6="accent6" hlink="hlink" folHlink="folHlink"/>
+  <p:notesStyle>
+    <a:lvl1pPr marL="0" algn="l" defTabSz="914400" rtl="0" eaLnBrk="1" latinLnBrk="0" hangingPunct="1">
+      <a:defRPr sz="1200" kern="1200">
+        <a:solidFill>
+          <a:schemeClr val="tx1"/>
+        </a:solidFill>
+        <a:latin typeface="+mn-lt"/>
+        <a:ea typeface="+mn-ea"/>
+        <a:cs typeface="+mn-cs"/>
+      </a:defRPr>
+    </a:lvl1pPr>
+    <a:lvl2pPr marL="457200" algn="l" defTabSz="914400" rtl="0" eaLnBrk="1" latinLnBrk="0" hangingPunct="1">
+      <a:defRPr sz="1200" kern="1200">
+        <a:solidFill>
+          <a:schemeClr val="tx1"/>
+        </a:solidFill>
+        <a:latin typeface="+mn-lt"/>
+        <a:ea typeface="+mn-ea"/>
+        <a:cs typeface="+mn-cs"/>
+      </a:defRPr>
+    </a:lvl2pPr>
+    <a:lvl3pPr marL="914400" algn="l" defTabSz="914400" rtl="0" eaLnBrk="1" latinLnBrk="0" hangingPunct="1">
+      <a:defRPr sz="1200" kern="1200">
+        <a:solidFill>
+          <a:schemeClr val="tx1"/>
+        </a:solidFill>
+        <a:latin typeface="+mn-lt"/>
+        <a:ea typeface="+mn-ea"/>
+        <a:cs typeface="+mn-cs"/>
+      </a:defRPr>
+    </a:lvl3pPr>
+    <a:lvl4pPr marL="1371600" algn="l" defTabSz="914400" rtl="0" eaLnBrk="1" latinLnBrk="0" hangingPunct="1">
+      <a:defRPr sz="1200" kern="1200">
+        <a:solidFill>
+          <a:schemeClr val="tx1"/>
+        </a:solidFill>
+        <a:latin typeface="+mn-lt"/>
+        <a:ea typeface="+mn-ea"/>
+        <a:cs typeface="+mn-cs"/>
+      </a:defRPr>
+    </a:lvl4pPr>
+    <a:lvl5pPr marL="1828800" algn="l" defTabSz="914400" rtl="0" eaLnBrk="1" latinLnBrk="0" hangingPunct="1">
+      <a:defRPr sz="1200" kern="1200">
+        <a:solidFill>
+          <a:schemeClr val="tx1"/>
+        </a:solidFill>
+        <a:latin typeface="+mn-lt"/>
+        <a:ea typeface="+mn-ea"/>
+        <a:cs typeface="+mn-cs"/>
+      </a:defRPr>
+    </a:lvl5pPr>
+    <a:lvl6pPr marL="2286000" algn="l" defTabSz="914400" rtl="0" eaLnBrk="1" latinLnBrk="0" hangingPunct="1">
+      <a:defRPr sz="1200" kern="1200">
+        <a:solidFill>
+          <a:schemeClr val="tx1"/>
+        </a:solidFill>
+        <a:latin typeface="+mn-lt"/>
+        <a:ea typeface="+mn-ea"/>
+        <a:cs typeface="+mn-cs"/>
+      </a:defRPr>
+    </a:lvl6pPr>
+    <a:lvl7pPr marL="2743200" algn="l" defTabSz="914400" rtl="0" eaLnBrk="1" latinLnBrk="0" hangingPunct="1">
+      <a:defRPr sz="1200" kern="1200">
+        <a:solidFill>
+          <a:schemeClr val="tx1"/>
+        </a:solidFill>
+        <a:latin typeface="+mn-lt"/>
+        <a:ea typeface="+mn-ea"/>
+        <a:cs typeface="+mn-cs"/>
+      </a:defRPr>
+    </a:lvl7pPr>
+    <a:lvl8pPr marL="3200400" algn="l" defTabSz="914400" rtl="0" eaLnBrk="1" latinLnBrk="0" hangingPunct="1">
+      <a:defRPr sz="1200" kern="1200">
+        <a:solidFill>
+          <a:schemeClr val="tx1"/>
+        </a:solidFill>
+        <a:latin typeface="+mn-lt"/>
+        <a:ea typeface="+mn-ea"/>
+        <a:cs typeface="+mn-cs"/>
+      </a:defRPr>
+    </a:lvl8pPr>
+    <a:lvl9pPr marL="3657600" algn="l" defTabSz="914400" rtl="0" eaLnBrk="1" latinLnBrk="0" hangingPunct="1">
+      <a:defRPr sz="1200" kern="1200">
+        <a:solidFill>
+          <a:schemeClr val="tx1"/>
+        </a:solidFill>
+        <a:latin typeface="+mn-lt"/>
+        <a:ea typeface="+mn-ea"/>
+        <a:cs typeface="+mn-cs"/>
+      </a:defRPr>
+    </a:lvl9pPr>
+  </p:notesStyle>
+</p:notesMaster>
+</file>
+
+<file path=ppt/notesSlides/notesSlide1.xml><?xml version="1.0" encoding="utf-8"?>
+<p:notes xmlns:a="http://schemas.openxmlformats.org/drawingml/2006/main" xmlns:r="http://schemas.openxmlformats.org/officeDocument/2006/relationships" xmlns:p="http://schemas.openxmlformats.org/presentationml/2006/main">
+  <p:cSld>
+    <p:spTree>
+      <p:nvGrpSpPr>
+        <p:cNvPr id="1" name=""/>
+        <p:cNvGrpSpPr/>
+        <p:nvPr/>
+      </p:nvGrpSpPr>
+      <p:grpSpPr>
+        <a:xfrm>
+          <a:off x="0" y="0"/>
+          <a:ext cx="0" cy="0"/>
+          <a:chOff x="0" y="0"/>
+          <a:chExt cx="0" cy="0"/>
+        </a:xfrm>
+      </p:grpSpPr>
+      <p:sp>
+        <p:nvSpPr>
+          <p:cNvPr id="2" name="Slide Image Placeholder 1"/>
+          <p:cNvSpPr>
+            <a:spLocks noGrp="1" noRot="1" noChangeAspect="1"/>
+          </p:cNvSpPr>
+          <p:nvPr>
+            <p:ph type="sldImg"/>
+          </p:nvPr>
+        </p:nvSpPr>
+        <p:spPr/>
+      </p:sp>
+      <p:sp>
+        <p:nvSpPr>
+          <p:cNvPr id="3" name="Notes Placeholder 2"/>
+          <p:cNvSpPr>
+            <a:spLocks noGrp="1"/>
+          </p:cNvSpPr>
+          <p:nvPr>
+            <p:ph type="body" idx="1"/>
+          </p:nvPr>
+        </p:nvSpPr>
+        <p:spPr/>
+        <p:txBody>
+          <a:bodyPr/>
+          <a:lstStyle/>
+          <a:p>
+            <a:endParaRPr lang="en-US" dirty="0"/>
+          </a:p>
+        </p:txBody>
+      </p:sp>
+      <p:sp>
+        <p:nvSpPr>
+          <p:cNvPr id="4" name="Slide Number Placeholder 3"/>
+          <p:cNvSpPr>
+            <a:spLocks noGrp="1"/>
+          </p:cNvSpPr>
+          <p:nvPr>
+            <p:ph type="sldNum" sz="quarter" idx="5"/>
+          </p:nvPr>
+        </p:nvSpPr>
+        <p:spPr/>
+        <p:txBody>
+          <a:bodyPr/>
+          <a:lstStyle/>
+          <a:p>
+            <a:fld id="{F6742F82-CB19-C049-A5F4-AD80AE78FAF2}" type="slidenum">
+              <a:rPr lang="en-US" smtClean="0"/>
+              <a:t>1</a:t>
+            </a:fld>
+            <a:endParaRPr lang="en-US"/>
+          </a:p>
+        </p:txBody>
+      </p:sp>
+    </p:spTree>
+    <p:extLst>
+      <p:ext uri="{BB962C8B-B14F-4D97-AF65-F5344CB8AC3E}">
+        <p14:creationId xmlns:p14="http://schemas.microsoft.com/office/powerpoint/2010/main" val="3131517025"/>
+      </p:ext>
+    </p:extLst>
+  </p:cSld>
+  <p:clrMapOvr>
+    <a:masterClrMapping/>
+  </p:clrMapOvr>
+</p:notes>
 </file>
 
 <file path=ppt/slideLayouts/slideLayout1.xml><?xml version="1.0" encoding="utf-8"?>
@@ -254,7 +696,7 @@
           <a:p>
             <a:fld id="{AB4363F0-2783-884A-9F1E-911F086597B5}" type="datetimeFigureOut">
               <a:rPr lang="en-US" smtClean="0"/>
-              <a:t>10/12/23</a:t>
+              <a:t>11/1/23</a:t>
             </a:fld>
             <a:endParaRPr lang="en-US"/>
           </a:p>
@@ -452,7 +894,7 @@
           <a:p>
             <a:fld id="{AB4363F0-2783-884A-9F1E-911F086597B5}" type="datetimeFigureOut">
               <a:rPr lang="en-US" smtClean="0"/>
-              <a:t>10/12/23</a:t>
+              <a:t>11/1/23</a:t>
             </a:fld>
             <a:endParaRPr lang="en-US"/>
           </a:p>
@@ -660,7 +1102,7 @@
           <a:p>
             <a:fld id="{AB4363F0-2783-884A-9F1E-911F086597B5}" type="datetimeFigureOut">
               <a:rPr lang="en-US" smtClean="0"/>
-              <a:t>10/12/23</a:t>
+              <a:t>11/1/23</a:t>
             </a:fld>
             <a:endParaRPr lang="en-US"/>
           </a:p>
@@ -858,7 +1300,7 @@
           <a:p>
             <a:fld id="{AB4363F0-2783-884A-9F1E-911F086597B5}" type="datetimeFigureOut">
               <a:rPr lang="en-US" smtClean="0"/>
-              <a:t>10/12/23</a:t>
+              <a:t>11/1/23</a:t>
             </a:fld>
             <a:endParaRPr lang="en-US"/>
           </a:p>
@@ -1133,7 +1575,7 @@
           <a:p>
             <a:fld id="{AB4363F0-2783-884A-9F1E-911F086597B5}" type="datetimeFigureOut">
               <a:rPr lang="en-US" smtClean="0"/>
-              <a:t>10/12/23</a:t>
+              <a:t>11/1/23</a:t>
             </a:fld>
             <a:endParaRPr lang="en-US"/>
           </a:p>
@@ -1398,7 +1840,7 @@
           <a:p>
             <a:fld id="{AB4363F0-2783-884A-9F1E-911F086597B5}" type="datetimeFigureOut">
               <a:rPr lang="en-US" smtClean="0"/>
-              <a:t>10/12/23</a:t>
+              <a:t>11/1/23</a:t>
             </a:fld>
             <a:endParaRPr lang="en-US"/>
           </a:p>
@@ -1810,7 +2252,7 @@
           <a:p>
             <a:fld id="{AB4363F0-2783-884A-9F1E-911F086597B5}" type="datetimeFigureOut">
               <a:rPr lang="en-US" smtClean="0"/>
-              <a:t>10/12/23</a:t>
+              <a:t>11/1/23</a:t>
             </a:fld>
             <a:endParaRPr lang="en-US"/>
           </a:p>
@@ -1951,7 +2393,7 @@
           <a:p>
             <a:fld id="{AB4363F0-2783-884A-9F1E-911F086597B5}" type="datetimeFigureOut">
               <a:rPr lang="en-US" smtClean="0"/>
-              <a:t>10/12/23</a:t>
+              <a:t>11/1/23</a:t>
             </a:fld>
             <a:endParaRPr lang="en-US"/>
           </a:p>
@@ -2064,7 +2506,7 @@
           <a:p>
             <a:fld id="{AB4363F0-2783-884A-9F1E-911F086597B5}" type="datetimeFigureOut">
               <a:rPr lang="en-US" smtClean="0"/>
-              <a:t>10/12/23</a:t>
+              <a:t>11/1/23</a:t>
             </a:fld>
             <a:endParaRPr lang="en-US"/>
           </a:p>
@@ -2375,7 +2817,7 @@
           <a:p>
             <a:fld id="{AB4363F0-2783-884A-9F1E-911F086597B5}" type="datetimeFigureOut">
               <a:rPr lang="en-US" smtClean="0"/>
-              <a:t>10/12/23</a:t>
+              <a:t>11/1/23</a:t>
             </a:fld>
             <a:endParaRPr lang="en-US"/>
           </a:p>
@@ -2663,7 +3105,7 @@
           <a:p>
             <a:fld id="{AB4363F0-2783-884A-9F1E-911F086597B5}" type="datetimeFigureOut">
               <a:rPr lang="en-US" smtClean="0"/>
-              <a:t>10/12/23</a:t>
+              <a:t>11/1/23</a:t>
             </a:fld>
             <a:endParaRPr lang="en-US"/>
           </a:p>
@@ -2904,7 +3346,7 @@
           <a:p>
             <a:fld id="{AB4363F0-2783-884A-9F1E-911F086597B5}" type="datetimeFigureOut">
               <a:rPr lang="en-US" smtClean="0"/>
-              <a:t>10/12/23</a:t>
+              <a:t>11/1/23</a:t>
             </a:fld>
             <a:endParaRPr lang="en-US"/>
           </a:p>
@@ -3321,6 +3763,376 @@
           <a:chExt cx="0" cy="0"/>
         </a:xfrm>
       </p:grpSpPr>
+      <p:pic>
+        <p:nvPicPr>
+          <p:cNvPr id="1026" name="Picture 2" descr="Zining Zhu">
+            <a:extLst>
+              <a:ext uri="{FF2B5EF4-FFF2-40B4-BE49-F238E27FC236}">
+                <a16:creationId xmlns:a16="http://schemas.microsoft.com/office/drawing/2014/main" id="{BC52CB5A-42B4-64D3-295A-FC714BC30921}"/>
+              </a:ext>
+            </a:extLst>
+          </p:cNvPr>
+          <p:cNvPicPr>
+            <a:picLocks noChangeAspect="1" noChangeArrowheads="1"/>
+          </p:cNvPicPr>
+          <p:nvPr/>
+        </p:nvPicPr>
+        <p:blipFill rotWithShape="1">
+          <a:blip r:embed="rId3">
+            <a:extLst>
+              <a:ext uri="{28A0092B-C50C-407E-A947-70E740481C1C}">
+                <a14:useLocalDpi xmlns:a14="http://schemas.microsoft.com/office/drawing/2010/main" val="0"/>
+              </a:ext>
+            </a:extLst>
+          </a:blip>
+          <a:srcRect l="18522" r="17200"/>
+          <a:stretch/>
+        </p:blipFill>
+        <p:spPr bwMode="auto">
+          <a:xfrm>
+            <a:off x="-25052" y="4553527"/>
+            <a:ext cx="1465162" cy="2279421"/>
+          </a:xfrm>
+          <a:prstGeom prst="rect">
+            <a:avLst/>
+          </a:prstGeom>
+          <a:noFill/>
+          <a:extLst>
+            <a:ext uri="{909E8E84-426E-40DD-AFC4-6F175D3DCCD1}">
+              <a14:hiddenFill xmlns:a14="http://schemas.microsoft.com/office/drawing/2010/main">
+                <a:solidFill>
+                  <a:srgbClr val="FFFFFF"/>
+                </a:solidFill>
+              </a14:hiddenFill>
+            </a:ext>
+          </a:extLst>
+        </p:spPr>
+      </p:pic>
+      <p:sp>
+        <p:nvSpPr>
+          <p:cNvPr id="7" name="TextBox 6">
+            <a:extLst>
+              <a:ext uri="{FF2B5EF4-FFF2-40B4-BE49-F238E27FC236}">
+                <a16:creationId xmlns:a16="http://schemas.microsoft.com/office/drawing/2014/main" id="{739178B1-CA7A-5DF8-EE34-66AABD65585F}"/>
+              </a:ext>
+            </a:extLst>
+          </p:cNvPr>
+          <p:cNvSpPr txBox="1"/>
+          <p:nvPr/>
+        </p:nvSpPr>
+        <p:spPr>
+          <a:xfrm>
+            <a:off x="1218060" y="6014698"/>
+            <a:ext cx="6826813" cy="861774"/>
+          </a:xfrm>
+          <a:prstGeom prst="rect">
+            <a:avLst/>
+          </a:prstGeom>
+          <a:noFill/>
+        </p:spPr>
+        <p:txBody>
+          <a:bodyPr wrap="square" rtlCol="0">
+            <a:spAutoFit/>
+          </a:bodyPr>
+          <a:lstStyle/>
+          <a:p>
+            <a:r>
+              <a:rPr lang="en-US" sz="2500" b="1" dirty="0">
+                <a:latin typeface="Helvetica" pitchFamily="2" charset="0"/>
+                <a:cs typeface="Arial" panose="020B0604020202020204" pitchFamily="34" charset="0"/>
+              </a:rPr>
+              <a:t>University of Toronto</a:t>
+            </a:r>
+            <a:br>
+              <a:rPr lang="en-US" sz="2500" b="1" dirty="0">
+                <a:latin typeface="Helvetica" pitchFamily="2" charset="0"/>
+                <a:cs typeface="Arial" panose="020B0604020202020204" pitchFamily="34" charset="0"/>
+              </a:rPr>
+            </a:br>
+            <a:r>
+              <a:rPr lang="en-US" sz="2500" b="1" dirty="0">
+                <a:latin typeface="Helvetica" pitchFamily="2" charset="0"/>
+                <a:cs typeface="Arial" panose="020B0604020202020204" pitchFamily="34" charset="0"/>
+              </a:rPr>
+              <a:t>Faculty of Applied Science and Engineering</a:t>
+            </a:r>
+          </a:p>
+        </p:txBody>
+      </p:sp>
+      <p:sp>
+        <p:nvSpPr>
+          <p:cNvPr id="2" name="TextBox 1">
+            <a:extLst>
+              <a:ext uri="{FF2B5EF4-FFF2-40B4-BE49-F238E27FC236}">
+                <a16:creationId xmlns:a16="http://schemas.microsoft.com/office/drawing/2014/main" id="{42FBB8AC-EC64-9676-66F5-49351A9D9B79}"/>
+              </a:ext>
+            </a:extLst>
+          </p:cNvPr>
+          <p:cNvSpPr txBox="1"/>
+          <p:nvPr/>
+        </p:nvSpPr>
+        <p:spPr>
+          <a:xfrm>
+            <a:off x="604413" y="296427"/>
+            <a:ext cx="10983174" cy="4401205"/>
+          </a:xfrm>
+          <a:prstGeom prst="rect">
+            <a:avLst/>
+          </a:prstGeom>
+          <a:noFill/>
+        </p:spPr>
+        <p:txBody>
+          <a:bodyPr wrap="square" rtlCol="0">
+            <a:spAutoFit/>
+          </a:bodyPr>
+          <a:lstStyle/>
+          <a:p>
+            <a:pPr algn="ctr"/>
+            <a:r>
+              <a:rPr lang="en-US" sz="3500" dirty="0">
+                <a:latin typeface="Helvetica" pitchFamily="2" charset="0"/>
+              </a:rPr>
+              <a:t>Engineering Science Thesis</a:t>
+            </a:r>
+          </a:p>
+          <a:p>
+            <a:pPr algn="ctr"/>
+            <a:endParaRPr lang="en-US" sz="3500" dirty="0">
+              <a:latin typeface="Helvetica" pitchFamily="2" charset="0"/>
+              <a:cs typeface="Arial" panose="020B0604020202020204" pitchFamily="34" charset="0"/>
+            </a:endParaRPr>
+          </a:p>
+          <a:p>
+            <a:pPr algn="ctr"/>
+            <a:endParaRPr lang="en-US" sz="3500" dirty="0">
+              <a:latin typeface="Helvetica" pitchFamily="2" charset="0"/>
+              <a:cs typeface="Arial" panose="020B0604020202020204" pitchFamily="34" charset="0"/>
+            </a:endParaRPr>
+          </a:p>
+          <a:p>
+            <a:pPr algn="ctr"/>
+            <a:r>
+              <a:rPr lang="en-US" sz="3500" b="1" u="sng" dirty="0">
+                <a:latin typeface="Helvetica" pitchFamily="2" charset="0"/>
+                <a:cs typeface="Arial" panose="020B0604020202020204" pitchFamily="34" charset="0"/>
+              </a:rPr>
+              <a:t>Sleep stage classification AI model design and FPGA implementation</a:t>
+            </a:r>
+            <a:br>
+              <a:rPr lang="en-US" sz="3500" dirty="0">
+                <a:latin typeface="Helvetica" pitchFamily="2" charset="0"/>
+              </a:rPr>
+            </a:br>
+            <a:endParaRPr lang="en-US" sz="3500" dirty="0">
+              <a:latin typeface="Helvetica" pitchFamily="2" charset="0"/>
+            </a:endParaRPr>
+          </a:p>
+          <a:p>
+            <a:pPr algn="ctr"/>
+            <a:br>
+              <a:rPr lang="en-US" sz="3500" dirty="0">
+                <a:latin typeface="Helvetica" pitchFamily="2" charset="0"/>
+              </a:rPr>
+            </a:br>
+            <a:r>
+              <a:rPr lang="en-US" sz="3500" dirty="0">
+                <a:latin typeface="Helvetica" pitchFamily="2" charset="0"/>
+              </a:rPr>
+              <a:t>Weekly progress log</a:t>
+            </a:r>
+          </a:p>
+        </p:txBody>
+      </p:sp>
+      <p:sp>
+        <p:nvSpPr>
+          <p:cNvPr id="3" name="TextBox 2">
+            <a:extLst>
+              <a:ext uri="{FF2B5EF4-FFF2-40B4-BE49-F238E27FC236}">
+                <a16:creationId xmlns:a16="http://schemas.microsoft.com/office/drawing/2014/main" id="{426C69DA-26F8-B84F-A34C-A1A95555FC38}"/>
+              </a:ext>
+            </a:extLst>
+          </p:cNvPr>
+          <p:cNvSpPr txBox="1"/>
+          <p:nvPr/>
+        </p:nvSpPr>
+        <p:spPr>
+          <a:xfrm>
+            <a:off x="3863109" y="5002222"/>
+            <a:ext cx="4465782" cy="707886"/>
+          </a:xfrm>
+          <a:prstGeom prst="rect">
+            <a:avLst/>
+          </a:prstGeom>
+          <a:noFill/>
+        </p:spPr>
+        <p:txBody>
+          <a:bodyPr wrap="square" rtlCol="0">
+            <a:spAutoFit/>
+          </a:bodyPr>
+          <a:lstStyle/>
+          <a:p>
+            <a:pPr algn="ctr"/>
+            <a:r>
+              <a:rPr lang="en-US" sz="2000" dirty="0">
+                <a:solidFill>
+                  <a:schemeClr val="tx1">
+                    <a:lumMod val="50000"/>
+                    <a:lumOff val="50000"/>
+                  </a:schemeClr>
+                </a:solidFill>
+                <a:latin typeface="Helvetica" pitchFamily="2" charset="0"/>
+              </a:rPr>
+              <a:t>Tristan Robitaille (</a:t>
+            </a:r>
+            <a:r>
+              <a:rPr lang="en-US" sz="2000" dirty="0" err="1">
+                <a:solidFill>
+                  <a:schemeClr val="tx1">
+                    <a:lumMod val="50000"/>
+                    <a:lumOff val="50000"/>
+                  </a:schemeClr>
+                </a:solidFill>
+                <a:latin typeface="Helvetica" pitchFamily="2" charset="0"/>
+              </a:rPr>
+              <a:t>EngSci</a:t>
+            </a:r>
+            <a:r>
+              <a:rPr lang="en-US" sz="2000" dirty="0">
+                <a:solidFill>
+                  <a:schemeClr val="tx1">
+                    <a:lumMod val="50000"/>
+                    <a:lumOff val="50000"/>
+                  </a:schemeClr>
+                </a:solidFill>
+                <a:latin typeface="Helvetica" pitchFamily="2" charset="0"/>
+              </a:rPr>
+              <a:t> 2T3 + PEY)</a:t>
+            </a:r>
+            <a:br>
+              <a:rPr lang="en-US" sz="2000" dirty="0">
+                <a:solidFill>
+                  <a:schemeClr val="tx1">
+                    <a:lumMod val="50000"/>
+                    <a:lumOff val="50000"/>
+                  </a:schemeClr>
+                </a:solidFill>
+                <a:latin typeface="Helvetica" pitchFamily="2" charset="0"/>
+              </a:rPr>
+            </a:br>
+            <a:r>
+              <a:rPr lang="en-US" sz="2000" dirty="0">
+                <a:solidFill>
+                  <a:schemeClr val="tx1">
+                    <a:lumMod val="50000"/>
+                    <a:lumOff val="50000"/>
+                  </a:schemeClr>
+                </a:solidFill>
+                <a:latin typeface="Helvetica" pitchFamily="2" charset="0"/>
+              </a:rPr>
+              <a:t>Supervisor: Prof. </a:t>
+            </a:r>
+            <a:r>
+              <a:rPr lang="en-US" sz="2000" dirty="0" err="1">
+                <a:solidFill>
+                  <a:schemeClr val="tx1">
+                    <a:lumMod val="50000"/>
+                    <a:lumOff val="50000"/>
+                  </a:schemeClr>
+                </a:solidFill>
+                <a:latin typeface="Helvetica" pitchFamily="2" charset="0"/>
+              </a:rPr>
+              <a:t>Xilin</a:t>
+            </a:r>
+            <a:r>
+              <a:rPr lang="en-US" sz="2000" dirty="0">
+                <a:solidFill>
+                  <a:schemeClr val="tx1">
+                    <a:lumMod val="50000"/>
+                    <a:lumOff val="50000"/>
+                  </a:schemeClr>
+                </a:solidFill>
+                <a:latin typeface="Helvetica" pitchFamily="2" charset="0"/>
+              </a:rPr>
+              <a:t> Liu (X-Lab)</a:t>
+            </a:r>
+          </a:p>
+        </p:txBody>
+      </p:sp>
+      <p:sp>
+        <p:nvSpPr>
+          <p:cNvPr id="8" name="TextBox 7">
+            <a:extLst>
+              <a:ext uri="{FF2B5EF4-FFF2-40B4-BE49-F238E27FC236}">
+                <a16:creationId xmlns:a16="http://schemas.microsoft.com/office/drawing/2014/main" id="{A25CCAD7-839A-0CC0-2D3A-99135AD13BE2}"/>
+              </a:ext>
+            </a:extLst>
+          </p:cNvPr>
+          <p:cNvSpPr txBox="1"/>
+          <p:nvPr/>
+        </p:nvSpPr>
+        <p:spPr>
+          <a:xfrm>
+            <a:off x="9287985" y="6476362"/>
+            <a:ext cx="2904837" cy="400110"/>
+          </a:xfrm>
+          <a:prstGeom prst="rect">
+            <a:avLst/>
+          </a:prstGeom>
+          <a:noFill/>
+        </p:spPr>
+        <p:txBody>
+          <a:bodyPr wrap="square" rtlCol="0">
+            <a:spAutoFit/>
+          </a:bodyPr>
+          <a:lstStyle/>
+          <a:p>
+            <a:pPr algn="r"/>
+            <a:r>
+              <a:rPr lang="en-US" sz="2000" dirty="0">
+                <a:solidFill>
+                  <a:schemeClr val="tx1">
+                    <a:lumMod val="50000"/>
+                    <a:lumOff val="50000"/>
+                  </a:schemeClr>
+                </a:solidFill>
+                <a:latin typeface="Helvetica" pitchFamily="2" charset="0"/>
+                <a:cs typeface="Arial" panose="020B0604020202020204" pitchFamily="34" charset="0"/>
+              </a:rPr>
+              <a:t>Fall 2023 – Winter 2024</a:t>
+            </a:r>
+          </a:p>
+        </p:txBody>
+      </p:sp>
+    </p:spTree>
+    <p:extLst>
+      <p:ext uri="{BB962C8B-B14F-4D97-AF65-F5344CB8AC3E}">
+        <p14:creationId xmlns:p14="http://schemas.microsoft.com/office/powerpoint/2010/main" val="3105970740"/>
+      </p:ext>
+    </p:extLst>
+  </p:cSld>
+  <p:clrMapOvr>
+    <a:masterClrMapping/>
+  </p:clrMapOvr>
+</p:sld>
+</file>
+
+<file path=ppt/slides/slide2.xml><?xml version="1.0" encoding="utf-8"?>
+<p:sld xmlns:a="http://schemas.openxmlformats.org/drawingml/2006/main" xmlns:r="http://schemas.openxmlformats.org/officeDocument/2006/relationships" xmlns:p="http://schemas.openxmlformats.org/presentationml/2006/main">
+  <p:cSld>
+    <p:spTree>
+      <p:nvGrpSpPr>
+        <p:cNvPr id="1" name=""/>
+        <p:cNvGrpSpPr/>
+        <p:nvPr/>
+      </p:nvGrpSpPr>
+      <p:grpSpPr>
+        <a:xfrm>
+          <a:off x="0" y="0"/>
+          <a:ext cx="0" cy="0"/>
+          <a:chOff x="0" y="0"/>
+          <a:chExt cx="0" cy="0"/>
+        </a:xfrm>
+      </p:grpSpPr>
       <p:graphicFrame>
         <p:nvGraphicFramePr>
           <p:cNvPr id="4" name="Table 3">
@@ -3333,17 +4145,11 @@
           <p:cNvGraphicFramePr>
             <a:graphicFrameLocks noGrp="1"/>
           </p:cNvGraphicFramePr>
-          <p:nvPr>
-            <p:extLst>
-              <p:ext uri="{D42A27DB-BD31-4B8C-83A1-F6EECF244321}">
-                <p14:modId xmlns:p14="http://schemas.microsoft.com/office/powerpoint/2010/main" val="824682513"/>
-              </p:ext>
-            </p:extLst>
-          </p:nvPr>
+          <p:nvPr/>
         </p:nvGraphicFramePr>
         <p:xfrm>
           <a:off x="555171" y="2977912"/>
-          <a:ext cx="11081658" cy="2077836"/>
+          <a:ext cx="11081658" cy="2103120"/>
         </p:xfrm>
         <a:graphic>
           <a:graphicData uri="http://schemas.openxmlformats.org/drawingml/2006/table">
@@ -3433,6 +4239,18 @@
                         <a:t>Clip lengths of 3.25s, 7.5s, 15s and 30s</a:t>
                       </a:r>
                     </a:p>
+                    <a:p>
+                      <a:pPr marL="342900" indent="-342900" algn="l">
+                        <a:buFont typeface="Arial" panose="020B0604020202020204" pitchFamily="34" charset="0"/>
+                        <a:buChar char="•"/>
+                      </a:pPr>
+                      <a:r>
+                        <a:rPr lang="en-US" dirty="0">
+                          <a:latin typeface="Helvetica" pitchFamily="2" charset="0"/>
+                        </a:rPr>
+                        <a:t>Merged stages 3 and 4</a:t>
+                      </a:r>
+                    </a:p>
                   </a:txBody>
                   <a:tcPr/>
                 </a:tc>
@@ -3468,15 +4286,9 @@
                         <a:rPr lang="en-CA" dirty="0">
                           <a:latin typeface="Helvetica" pitchFamily="2" charset="0"/>
                         </a:rPr>
-                        <a:t>SS3_filter</a:t>
+                        <a:t>SS3_filter_new</a:t>
                       </a:r>
-                      <a:r>
-                        <a:rPr lang="en-CA">
-                          <a:latin typeface="Helvetica" pitchFamily="2" charset="0"/>
-                        </a:rPr>
-                        <a:t>_new</a:t>
-                      </a:r>
-                      <a:endParaRPr lang="en-US">
+                      <a:endParaRPr lang="en-US" dirty="0">
                         <a:latin typeface="Helvetica" pitchFamily="2" charset="0"/>
                       </a:endParaRPr>
                     </a:p>
@@ -3528,6 +4340,18 @@
                         <a:t>Use n previous recognized stages as input</a:t>
                       </a:r>
                     </a:p>
+                    <a:p>
+                      <a:pPr marL="342900" lvl="0" indent="-342900" algn="l">
+                        <a:buFont typeface="Arial" panose="020B0604020202020204" pitchFamily="34" charset="0"/>
+                        <a:buChar char="•"/>
+                      </a:pPr>
+                      <a:r>
+                        <a:rPr lang="en-US" dirty="0">
+                          <a:latin typeface="Helvetica" pitchFamily="2" charset="0"/>
+                        </a:rPr>
+                        <a:t>Multiple channels input</a:t>
+                      </a:r>
+                    </a:p>
                   </a:txBody>
                   <a:tcPr/>
                 </a:tc>
@@ -3785,7 +4609,7 @@
     </p:spTree>
     <p:extLst>
       <p:ext uri="{BB962C8B-B14F-4D97-AF65-F5344CB8AC3E}">
-        <p14:creationId xmlns:p14="http://schemas.microsoft.com/office/powerpoint/2010/main" val="3105970740"/>
+        <p14:creationId xmlns:p14="http://schemas.microsoft.com/office/powerpoint/2010/main" val="745920043"/>
       </p:ext>
     </p:extLst>
   </p:cSld>
@@ -4088,4 +4912,299 @@
     </a:ext>
   </a:extLst>
 </a:theme>
+</file>
+
+<file path=ppt/theme/theme2.xml><?xml version="1.0" encoding="utf-8"?>
+<a:theme xmlns:a="http://schemas.openxmlformats.org/drawingml/2006/main" name="Office Theme">
+  <a:themeElements>
+    <a:clrScheme name="Office">
+      <a:dk1>
+        <a:sysClr val="windowText" lastClr="000000"/>
+      </a:dk1>
+      <a:lt1>
+        <a:sysClr val="window" lastClr="FFFFFF"/>
+      </a:lt1>
+      <a:dk2>
+        <a:srgbClr val="44546A"/>
+      </a:dk2>
+      <a:lt2>
+        <a:srgbClr val="E7E6E6"/>
+      </a:lt2>
+      <a:accent1>
+        <a:srgbClr val="4472C4"/>
+      </a:accent1>
+      <a:accent2>
+        <a:srgbClr val="ED7D31"/>
+      </a:accent2>
+      <a:accent3>
+        <a:srgbClr val="A5A5A5"/>
+      </a:accent3>
+      <a:accent4>
+        <a:srgbClr val="FFC000"/>
+      </a:accent4>
+      <a:accent5>
+        <a:srgbClr val="5B9BD5"/>
+      </a:accent5>
+      <a:accent6>
+        <a:srgbClr val="70AD47"/>
+      </a:accent6>
+      <a:hlink>
+        <a:srgbClr val="0563C1"/>
+      </a:hlink>
+      <a:folHlink>
+        <a:srgbClr val="954F72"/>
+      </a:folHlink>
+    </a:clrScheme>
+    <a:fontScheme name="Office">
+      <a:majorFont>
+        <a:latin typeface="Calibri Light" panose="020F0302020204030204"/>
+        <a:ea typeface=""/>
+        <a:cs typeface=""/>
+        <a:font script="Jpan" typeface="游ゴシック Light"/>
+        <a:font script="Hang" typeface="맑은 고딕"/>
+        <a:font script="Hans" typeface="等线 Light"/>
+        <a:font script="Hant" typeface="新細明體"/>
+        <a:font script="Arab" typeface="Times New Roman"/>
+        <a:font script="Hebr" typeface="Times New Roman"/>
+        <a:font script="Thai" typeface="Angsana New"/>
+        <a:font script="Ethi" typeface="Nyala"/>
+        <a:font script="Beng" typeface="Vrinda"/>
+        <a:font script="Gujr" typeface="Shruti"/>
+        <a:font script="Khmr" typeface="MoolBoran"/>
+        <a:font script="Knda" typeface="Tunga"/>
+        <a:font script="Guru" typeface="Raavi"/>
+        <a:font script="Cans" typeface="Euphemia"/>
+        <a:font script="Cher" typeface="Plantagenet Cherokee"/>
+        <a:font script="Yiii" typeface="Microsoft Yi Baiti"/>
+        <a:font script="Tibt" typeface="Microsoft Himalaya"/>
+        <a:font script="Thaa" typeface="MV Boli"/>
+        <a:font script="Deva" typeface="Mangal"/>
+        <a:font script="Telu" typeface="Gautami"/>
+        <a:font script="Taml" typeface="Latha"/>
+        <a:font script="Syrc" typeface="Estrangelo Edessa"/>
+        <a:font script="Orya" typeface="Kalinga"/>
+        <a:font script="Mlym" typeface="Kartika"/>
+        <a:font script="Laoo" typeface="DokChampa"/>
+        <a:font script="Sinh" typeface="Iskoola Pota"/>
+        <a:font script="Mong" typeface="Mongolian Baiti"/>
+        <a:font script="Viet" typeface="Times New Roman"/>
+        <a:font script="Uigh" typeface="Microsoft Uighur"/>
+        <a:font script="Geor" typeface="Sylfaen"/>
+        <a:font script="Armn" typeface="Arial"/>
+        <a:font script="Bugi" typeface="Leelawadee UI"/>
+        <a:font script="Bopo" typeface="Microsoft JhengHei"/>
+        <a:font script="Java" typeface="Javanese Text"/>
+        <a:font script="Lisu" typeface="Segoe UI"/>
+        <a:font script="Mymr" typeface="Myanmar Text"/>
+        <a:font script="Nkoo" typeface="Ebrima"/>
+        <a:font script="Olck" typeface="Nirmala UI"/>
+        <a:font script="Osma" typeface="Ebrima"/>
+        <a:font script="Phag" typeface="Phagspa"/>
+        <a:font script="Syrn" typeface="Estrangelo Edessa"/>
+        <a:font script="Syrj" typeface="Estrangelo Edessa"/>
+        <a:font script="Syre" typeface="Estrangelo Edessa"/>
+        <a:font script="Sora" typeface="Nirmala UI"/>
+        <a:font script="Tale" typeface="Microsoft Tai Le"/>
+        <a:font script="Talu" typeface="Microsoft New Tai Lue"/>
+        <a:font script="Tfng" typeface="Ebrima"/>
+      </a:majorFont>
+      <a:minorFont>
+        <a:latin typeface="Calibri" panose="020F0502020204030204"/>
+        <a:ea typeface=""/>
+        <a:cs typeface=""/>
+        <a:font script="Jpan" typeface="游ゴシック"/>
+        <a:font script="Hang" typeface="맑은 고딕"/>
+        <a:font script="Hans" typeface="等线"/>
+        <a:font script="Hant" typeface="新細明體"/>
+        <a:font script="Arab" typeface="Arial"/>
+        <a:font script="Hebr" typeface="Arial"/>
+        <a:font script="Thai" typeface="Cordia New"/>
+        <a:font script="Ethi" typeface="Nyala"/>
+        <a:font script="Beng" typeface="Vrinda"/>
+        <a:font script="Gujr" typeface="Shruti"/>
+        <a:font script="Khmr" typeface="DaunPenh"/>
+        <a:font script="Knda" typeface="Tunga"/>
+        <a:font script="Guru" typeface="Raavi"/>
+        <a:font script="Cans" typeface="Euphemia"/>
+        <a:font script="Cher" typeface="Plantagenet Cherokee"/>
+        <a:font script="Yiii" typeface="Microsoft Yi Baiti"/>
+        <a:font script="Tibt" typeface="Microsoft Himalaya"/>
+        <a:font script="Thaa" typeface="MV Boli"/>
+        <a:font script="Deva" typeface="Mangal"/>
+        <a:font script="Telu" typeface="Gautami"/>
+        <a:font script="Taml" typeface="Latha"/>
+        <a:font script="Syrc" typeface="Estrangelo Edessa"/>
+        <a:font script="Orya" typeface="Kalinga"/>
+        <a:font script="Mlym" typeface="Kartika"/>
+        <a:font script="Laoo" typeface="DokChampa"/>
+        <a:font script="Sinh" typeface="Iskoola Pota"/>
+        <a:font script="Mong" typeface="Mongolian Baiti"/>
+        <a:font script="Viet" typeface="Arial"/>
+        <a:font script="Uigh" typeface="Microsoft Uighur"/>
+        <a:font script="Geor" typeface="Sylfaen"/>
+        <a:font script="Armn" typeface="Arial"/>
+        <a:font script="Bugi" typeface="Leelawadee UI"/>
+        <a:font script="Bopo" typeface="Microsoft JhengHei"/>
+        <a:font script="Java" typeface="Javanese Text"/>
+        <a:font script="Lisu" typeface="Segoe UI"/>
+        <a:font script="Mymr" typeface="Myanmar Text"/>
+        <a:font script="Nkoo" typeface="Ebrima"/>
+        <a:font script="Olck" typeface="Nirmala UI"/>
+        <a:font script="Osma" typeface="Ebrima"/>
+        <a:font script="Phag" typeface="Phagspa"/>
+        <a:font script="Syrn" typeface="Estrangelo Edessa"/>
+        <a:font script="Syrj" typeface="Estrangelo Edessa"/>
+        <a:font script="Syre" typeface="Estrangelo Edessa"/>
+        <a:font script="Sora" typeface="Nirmala UI"/>
+        <a:font script="Tale" typeface="Microsoft Tai Le"/>
+        <a:font script="Talu" typeface="Microsoft New Tai Lue"/>
+        <a:font script="Tfng" typeface="Ebrima"/>
+      </a:minorFont>
+    </a:fontScheme>
+    <a:fmtScheme name="Office">
+      <a:fillStyleLst>
+        <a:solidFill>
+          <a:schemeClr val="phClr"/>
+        </a:solidFill>
+        <a:gradFill rotWithShape="1">
+          <a:gsLst>
+            <a:gs pos="0">
+              <a:schemeClr val="phClr">
+                <a:lumMod val="110000"/>
+                <a:satMod val="105000"/>
+                <a:tint val="67000"/>
+              </a:schemeClr>
+            </a:gs>
+            <a:gs pos="50000">
+              <a:schemeClr val="phClr">
+                <a:lumMod val="105000"/>
+                <a:satMod val="103000"/>
+                <a:tint val="73000"/>
+              </a:schemeClr>
+            </a:gs>
+            <a:gs pos="100000">
+              <a:schemeClr val="phClr">
+                <a:lumMod val="105000"/>
+                <a:satMod val="109000"/>
+                <a:tint val="81000"/>
+              </a:schemeClr>
+            </a:gs>
+          </a:gsLst>
+          <a:lin ang="5400000" scaled="0"/>
+        </a:gradFill>
+        <a:gradFill rotWithShape="1">
+          <a:gsLst>
+            <a:gs pos="0">
+              <a:schemeClr val="phClr">
+                <a:satMod val="103000"/>
+                <a:lumMod val="102000"/>
+                <a:tint val="94000"/>
+              </a:schemeClr>
+            </a:gs>
+            <a:gs pos="50000">
+              <a:schemeClr val="phClr">
+                <a:satMod val="110000"/>
+                <a:lumMod val="100000"/>
+                <a:shade val="100000"/>
+              </a:schemeClr>
+            </a:gs>
+            <a:gs pos="100000">
+              <a:schemeClr val="phClr">
+                <a:lumMod val="99000"/>
+                <a:satMod val="120000"/>
+                <a:shade val="78000"/>
+              </a:schemeClr>
+            </a:gs>
+          </a:gsLst>
+          <a:lin ang="5400000" scaled="0"/>
+        </a:gradFill>
+      </a:fillStyleLst>
+      <a:lnStyleLst>
+        <a:ln w="6350" cap="flat" cmpd="sng" algn="ctr">
+          <a:solidFill>
+            <a:schemeClr val="phClr"/>
+          </a:solidFill>
+          <a:prstDash val="solid"/>
+          <a:miter lim="800000"/>
+        </a:ln>
+        <a:ln w="12700" cap="flat" cmpd="sng" algn="ctr">
+          <a:solidFill>
+            <a:schemeClr val="phClr"/>
+          </a:solidFill>
+          <a:prstDash val="solid"/>
+          <a:miter lim="800000"/>
+        </a:ln>
+        <a:ln w="19050" cap="flat" cmpd="sng" algn="ctr">
+          <a:solidFill>
+            <a:schemeClr val="phClr"/>
+          </a:solidFill>
+          <a:prstDash val="solid"/>
+          <a:miter lim="800000"/>
+        </a:ln>
+      </a:lnStyleLst>
+      <a:effectStyleLst>
+        <a:effectStyle>
+          <a:effectLst/>
+        </a:effectStyle>
+        <a:effectStyle>
+          <a:effectLst/>
+        </a:effectStyle>
+        <a:effectStyle>
+          <a:effectLst>
+            <a:outerShdw blurRad="57150" dist="19050" dir="5400000" algn="ctr" rotWithShape="0">
+              <a:srgbClr val="000000">
+                <a:alpha val="63000"/>
+              </a:srgbClr>
+            </a:outerShdw>
+          </a:effectLst>
+        </a:effectStyle>
+      </a:effectStyleLst>
+      <a:bgFillStyleLst>
+        <a:solidFill>
+          <a:schemeClr val="phClr"/>
+        </a:solidFill>
+        <a:solidFill>
+          <a:schemeClr val="phClr">
+            <a:tint val="95000"/>
+            <a:satMod val="170000"/>
+          </a:schemeClr>
+        </a:solidFill>
+        <a:gradFill rotWithShape="1">
+          <a:gsLst>
+            <a:gs pos="0">
+              <a:schemeClr val="phClr">
+                <a:tint val="93000"/>
+                <a:satMod val="150000"/>
+                <a:shade val="98000"/>
+                <a:lumMod val="102000"/>
+              </a:schemeClr>
+            </a:gs>
+            <a:gs pos="50000">
+              <a:schemeClr val="phClr">
+                <a:tint val="98000"/>
+                <a:satMod val="130000"/>
+                <a:shade val="90000"/>
+                <a:lumMod val="103000"/>
+              </a:schemeClr>
+            </a:gs>
+            <a:gs pos="100000">
+              <a:schemeClr val="phClr">
+                <a:shade val="63000"/>
+                <a:satMod val="120000"/>
+              </a:schemeClr>
+            </a:gs>
+          </a:gsLst>
+          <a:lin ang="5400000" scaled="0"/>
+        </a:gradFill>
+      </a:bgFillStyleLst>
+    </a:fmtScheme>
+  </a:themeElements>
+  <a:objectDefaults/>
+  <a:extraClrSchemeLst/>
+  <a:extLst>
+    <a:ext uri="{05A4C25C-085E-4340-85A3-A5531E510DB2}">
+      <thm15:themeFamily xmlns:thm15="http://schemas.microsoft.com/office/thememl/2012/main" name="Office Theme" id="{62F939B6-93AF-4DB8-9C6B-D6C7DFDC589F}" vid="{4A3C46E8-61CC-4603-A589-7422A47A8E4A}"/>
+    </a:ext>
+  </a:extLst>
+</a:theme>
 </file>
</xml_diff>

<commit_message>
Added Coral USB Edge TPU files and variable filtering
</commit_message>
<xml_diff>
--- a/weekly_progress.pptx
+++ b/weekly_progress.pptx
@@ -5,11 +5,12 @@
     <p:sldMasterId id="2147483648" r:id="rId1"/>
   </p:sldMasterIdLst>
   <p:notesMasterIdLst>
-    <p:notesMasterId r:id="rId4"/>
+    <p:notesMasterId r:id="rId5"/>
   </p:notesMasterIdLst>
   <p:sldIdLst>
     <p:sldId id="256" r:id="rId2"/>
     <p:sldId id="257" r:id="rId3"/>
+    <p:sldId id="258" r:id="rId4"/>
   </p:sldIdLst>
   <p:sldSz cx="12192000" cy="6858000"/>
   <p:notesSz cx="6858000" cy="9144000"/>
@@ -198,7 +199,7 @@
           <a:p>
             <a:fld id="{BF3B6487-623F-5144-817D-0678D4F16A76}" type="datetimeFigureOut">
               <a:rPr lang="en-US" smtClean="0"/>
-              <a:t>11/1/23</a:t>
+              <a:t>12/21/23</a:t>
             </a:fld>
             <a:endParaRPr lang="en-US"/>
           </a:p>
@@ -696,7 +697,7 @@
           <a:p>
             <a:fld id="{AB4363F0-2783-884A-9F1E-911F086597B5}" type="datetimeFigureOut">
               <a:rPr lang="en-US" smtClean="0"/>
-              <a:t>11/1/23</a:t>
+              <a:t>12/21/23</a:t>
             </a:fld>
             <a:endParaRPr lang="en-US"/>
           </a:p>
@@ -894,7 +895,7 @@
           <a:p>
             <a:fld id="{AB4363F0-2783-884A-9F1E-911F086597B5}" type="datetimeFigureOut">
               <a:rPr lang="en-US" smtClean="0"/>
-              <a:t>11/1/23</a:t>
+              <a:t>12/21/23</a:t>
             </a:fld>
             <a:endParaRPr lang="en-US"/>
           </a:p>
@@ -1102,7 +1103,7 @@
           <a:p>
             <a:fld id="{AB4363F0-2783-884A-9F1E-911F086597B5}" type="datetimeFigureOut">
               <a:rPr lang="en-US" smtClean="0"/>
-              <a:t>11/1/23</a:t>
+              <a:t>12/21/23</a:t>
             </a:fld>
             <a:endParaRPr lang="en-US"/>
           </a:p>
@@ -1300,7 +1301,7 @@
           <a:p>
             <a:fld id="{AB4363F0-2783-884A-9F1E-911F086597B5}" type="datetimeFigureOut">
               <a:rPr lang="en-US" smtClean="0"/>
-              <a:t>11/1/23</a:t>
+              <a:t>12/21/23</a:t>
             </a:fld>
             <a:endParaRPr lang="en-US"/>
           </a:p>
@@ -1575,7 +1576,7 @@
           <a:p>
             <a:fld id="{AB4363F0-2783-884A-9F1E-911F086597B5}" type="datetimeFigureOut">
               <a:rPr lang="en-US" smtClean="0"/>
-              <a:t>11/1/23</a:t>
+              <a:t>12/21/23</a:t>
             </a:fld>
             <a:endParaRPr lang="en-US"/>
           </a:p>
@@ -1840,7 +1841,7 @@
           <a:p>
             <a:fld id="{AB4363F0-2783-884A-9F1E-911F086597B5}" type="datetimeFigureOut">
               <a:rPr lang="en-US" smtClean="0"/>
-              <a:t>11/1/23</a:t>
+              <a:t>12/21/23</a:t>
             </a:fld>
             <a:endParaRPr lang="en-US"/>
           </a:p>
@@ -2252,7 +2253,7 @@
           <a:p>
             <a:fld id="{AB4363F0-2783-884A-9F1E-911F086597B5}" type="datetimeFigureOut">
               <a:rPr lang="en-US" smtClean="0"/>
-              <a:t>11/1/23</a:t>
+              <a:t>12/21/23</a:t>
             </a:fld>
             <a:endParaRPr lang="en-US"/>
           </a:p>
@@ -2393,7 +2394,7 @@
           <a:p>
             <a:fld id="{AB4363F0-2783-884A-9F1E-911F086597B5}" type="datetimeFigureOut">
               <a:rPr lang="en-US" smtClean="0"/>
-              <a:t>11/1/23</a:t>
+              <a:t>12/21/23</a:t>
             </a:fld>
             <a:endParaRPr lang="en-US"/>
           </a:p>
@@ -2506,7 +2507,7 @@
           <a:p>
             <a:fld id="{AB4363F0-2783-884A-9F1E-911F086597B5}" type="datetimeFigureOut">
               <a:rPr lang="en-US" smtClean="0"/>
-              <a:t>11/1/23</a:t>
+              <a:t>12/21/23</a:t>
             </a:fld>
             <a:endParaRPr lang="en-US"/>
           </a:p>
@@ -2817,7 +2818,7 @@
           <a:p>
             <a:fld id="{AB4363F0-2783-884A-9F1E-911F086597B5}" type="datetimeFigureOut">
               <a:rPr lang="en-US" smtClean="0"/>
-              <a:t>11/1/23</a:t>
+              <a:t>12/21/23</a:t>
             </a:fld>
             <a:endParaRPr lang="en-US"/>
           </a:p>
@@ -3105,7 +3106,7 @@
           <a:p>
             <a:fld id="{AB4363F0-2783-884A-9F1E-911F086597B5}" type="datetimeFigureOut">
               <a:rPr lang="en-US" smtClean="0"/>
-              <a:t>11/1/23</a:t>
+              <a:t>12/21/23</a:t>
             </a:fld>
             <a:endParaRPr lang="en-US"/>
           </a:p>
@@ -3346,7 +3347,7 @@
           <a:p>
             <a:fld id="{AB4363F0-2783-884A-9F1E-911F086597B5}" type="datetimeFigureOut">
               <a:rPr lang="en-US" smtClean="0"/>
-              <a:t>11/1/23</a:t>
+              <a:t>12/21/23</a:t>
             </a:fld>
             <a:endParaRPr lang="en-US"/>
           </a:p>
@@ -4610,6 +4611,582 @@
     <p:extLst>
       <p:ext uri="{BB962C8B-B14F-4D97-AF65-F5344CB8AC3E}">
         <p14:creationId xmlns:p14="http://schemas.microsoft.com/office/powerpoint/2010/main" val="745920043"/>
+      </p:ext>
+    </p:extLst>
+  </p:cSld>
+  <p:clrMapOvr>
+    <a:masterClrMapping/>
+  </p:clrMapOvr>
+</p:sld>
+</file>
+
+<file path=ppt/slides/slide3.xml><?xml version="1.0" encoding="utf-8"?>
+<p:sld xmlns:a="http://schemas.openxmlformats.org/drawingml/2006/main" xmlns:r="http://schemas.openxmlformats.org/officeDocument/2006/relationships" xmlns:p="http://schemas.openxmlformats.org/presentationml/2006/main">
+  <p:cSld>
+    <p:spTree>
+      <p:nvGrpSpPr>
+        <p:cNvPr id="1" name=""/>
+        <p:cNvGrpSpPr/>
+        <p:nvPr/>
+      </p:nvGrpSpPr>
+      <p:grpSpPr>
+        <a:xfrm>
+          <a:off x="0" y="0"/>
+          <a:ext cx="0" cy="0"/>
+          <a:chOff x="0" y="0"/>
+          <a:chExt cx="0" cy="0"/>
+        </a:xfrm>
+      </p:grpSpPr>
+      <p:graphicFrame>
+        <p:nvGraphicFramePr>
+          <p:cNvPr id="4" name="Table 3">
+            <a:extLst>
+              <a:ext uri="{FF2B5EF4-FFF2-40B4-BE49-F238E27FC236}">
+                <a16:creationId xmlns:a16="http://schemas.microsoft.com/office/drawing/2014/main" id="{E0C266C5-A0B8-14F4-252C-B279A25CA533}"/>
+              </a:ext>
+            </a:extLst>
+          </p:cNvPr>
+          <p:cNvGraphicFramePr>
+            <a:graphicFrameLocks noGrp="1"/>
+          </p:cNvGraphicFramePr>
+          <p:nvPr>
+            <p:extLst>
+              <p:ext uri="{D42A27DB-BD31-4B8C-83A1-F6EECF244321}">
+                <p14:modId xmlns:p14="http://schemas.microsoft.com/office/powerpoint/2010/main" val="3002504068"/>
+              </p:ext>
+            </p:extLst>
+          </p:nvPr>
+        </p:nvGraphicFramePr>
+        <p:xfrm>
+          <a:off x="555171" y="2003656"/>
+          <a:ext cx="11081657" cy="1561581"/>
+        </p:xfrm>
+        <a:graphic>
+          <a:graphicData uri="http://schemas.openxmlformats.org/drawingml/2006/table">
+            <a:tbl>
+              <a:tblPr firstRow="1" bandRow="1">
+                <a:tableStyleId>{073A0DAA-6AF3-43AB-8588-CEC1D06C72B9}</a:tableStyleId>
+              </a:tblPr>
+              <a:tblGrid>
+                <a:gridCol w="4487884">
+                  <a:extLst>
+                    <a:ext uri="{9D8B030D-6E8A-4147-A177-3AD203B41FA5}">
+                      <a16:colId xmlns:a16="http://schemas.microsoft.com/office/drawing/2014/main" val="3262114030"/>
+                    </a:ext>
+                  </a:extLst>
+                </a:gridCol>
+                <a:gridCol w="3241963">
+                  <a:extLst>
+                    <a:ext uri="{9D8B030D-6E8A-4147-A177-3AD203B41FA5}">
+                      <a16:colId xmlns:a16="http://schemas.microsoft.com/office/drawing/2014/main" val="3728393235"/>
+                    </a:ext>
+                  </a:extLst>
+                </a:gridCol>
+                <a:gridCol w="3351810">
+                  <a:extLst>
+                    <a:ext uri="{9D8B030D-6E8A-4147-A177-3AD203B41FA5}">
+                      <a16:colId xmlns:a16="http://schemas.microsoft.com/office/drawing/2014/main" val="918930651"/>
+                    </a:ext>
+                  </a:extLst>
+                </a:gridCol>
+              </a:tblGrid>
+              <a:tr h="268794">
+                <a:tc>
+                  <a:txBody>
+                    <a:bodyPr/>
+                    <a:lstStyle/>
+                    <a:p>
+                      <a:pPr algn="ctr"/>
+                      <a:r>
+                        <a:rPr lang="en-US" dirty="0">
+                          <a:latin typeface="Helvetica" pitchFamily="2" charset="0"/>
+                        </a:rPr>
+                        <a:t>Metric</a:t>
+                      </a:r>
+                    </a:p>
+                  </a:txBody>
+                  <a:tcPr/>
+                </a:tc>
+                <a:tc>
+                  <a:txBody>
+                    <a:bodyPr/>
+                    <a:lstStyle/>
+                    <a:p>
+                      <a:pPr algn="ctr"/>
+                      <a:r>
+                        <a:rPr lang="en-US" dirty="0">
+                          <a:latin typeface="Helvetica" pitchFamily="2" charset="0"/>
+                        </a:rPr>
+                        <a:t>Edge TPU</a:t>
+                      </a:r>
+                    </a:p>
+                  </a:txBody>
+                  <a:tcPr/>
+                </a:tc>
+                <a:tc>
+                  <a:txBody>
+                    <a:bodyPr/>
+                    <a:lstStyle/>
+                    <a:p>
+                      <a:pPr algn="ctr"/>
+                      <a:r>
+                        <a:rPr lang="en-US" dirty="0">
+                          <a:latin typeface="Helvetica" pitchFamily="2" charset="0"/>
+                        </a:rPr>
+                        <a:t>CPU</a:t>
+                      </a:r>
+                    </a:p>
+                  </a:txBody>
+                  <a:tcPr/>
+                </a:tc>
+                <a:extLst>
+                  <a:ext uri="{0D108BD9-81ED-4DB2-BD59-A6C34878D82A}">
+                    <a16:rowId xmlns:a16="http://schemas.microsoft.com/office/drawing/2014/main" val="315215125"/>
+                  </a:ext>
+                </a:extLst>
+              </a:tr>
+              <a:tr h="595457">
+                <a:tc>
+                  <a:txBody>
+                    <a:bodyPr/>
+                    <a:lstStyle/>
+                    <a:p>
+                      <a:pPr marL="0" indent="0" algn="ctr">
+                        <a:buFont typeface="Arial" panose="020B0604020202020204" pitchFamily="34" charset="0"/>
+                        <a:buNone/>
+                      </a:pPr>
+                      <a:r>
+                        <a:rPr lang="en-US" dirty="0">
+                          <a:latin typeface="Helvetica" pitchFamily="2" charset="0"/>
+                        </a:rPr>
+                        <a:t>Mean inference time (n = 2000)</a:t>
+                      </a:r>
+                    </a:p>
+                  </a:txBody>
+                  <a:tcPr anchor="ctr"/>
+                </a:tc>
+                <a:tc>
+                  <a:txBody>
+                    <a:bodyPr/>
+                    <a:lstStyle/>
+                    <a:p>
+                      <a:pPr marL="0" marR="0" lvl="0" indent="0" algn="ctr" defTabSz="914400" rtl="0" eaLnBrk="1" fontAlgn="auto" latinLnBrk="0" hangingPunct="1">
+                        <a:lnSpc>
+                          <a:spcPct val="100000"/>
+                        </a:lnSpc>
+                        <a:spcBef>
+                          <a:spcPts val="0"/>
+                        </a:spcBef>
+                        <a:spcAft>
+                          <a:spcPts val="0"/>
+                        </a:spcAft>
+                        <a:buClrTx/>
+                        <a:buSzTx/>
+                        <a:buFont typeface="Arial" panose="020B0604020202020204" pitchFamily="34" charset="0"/>
+                        <a:buNone/>
+                        <a:tabLst/>
+                        <a:defRPr/>
+                      </a:pPr>
+                      <a:r>
+                        <a:rPr lang="en-US" dirty="0">
+                          <a:latin typeface="Helvetica" pitchFamily="2" charset="0"/>
+                        </a:rPr>
+                        <a:t>0.754ms</a:t>
+                      </a:r>
+                    </a:p>
+                  </a:txBody>
+                  <a:tcPr anchor="ctr"/>
+                </a:tc>
+                <a:tc>
+                  <a:txBody>
+                    <a:bodyPr/>
+                    <a:lstStyle/>
+                    <a:p>
+                      <a:pPr marL="0" marR="0" lvl="0" indent="0" algn="ctr" defTabSz="914400" rtl="0" eaLnBrk="1" fontAlgn="auto" latinLnBrk="0" hangingPunct="1">
+                        <a:lnSpc>
+                          <a:spcPct val="100000"/>
+                        </a:lnSpc>
+                        <a:spcBef>
+                          <a:spcPts val="0"/>
+                        </a:spcBef>
+                        <a:spcAft>
+                          <a:spcPts val="0"/>
+                        </a:spcAft>
+                        <a:buClrTx/>
+                        <a:buSzTx/>
+                        <a:buFont typeface="Arial" panose="020B0604020202020204" pitchFamily="34" charset="0"/>
+                        <a:buNone/>
+                        <a:tabLst/>
+                        <a:defRPr/>
+                      </a:pPr>
+                      <a:r>
+                        <a:rPr lang="en-US" dirty="0">
+                          <a:latin typeface="Helvetica" pitchFamily="2" charset="0"/>
+                        </a:rPr>
+                        <a:t>2.706ms</a:t>
+                      </a:r>
+                    </a:p>
+                  </a:txBody>
+                  <a:tcPr anchor="ctr"/>
+                </a:tc>
+                <a:extLst>
+                  <a:ext uri="{0D108BD9-81ED-4DB2-BD59-A6C34878D82A}">
+                    <a16:rowId xmlns:a16="http://schemas.microsoft.com/office/drawing/2014/main" val="2168496254"/>
+                  </a:ext>
+                </a:extLst>
+              </a:tr>
+              <a:tr h="600364">
+                <a:tc>
+                  <a:txBody>
+                    <a:bodyPr/>
+                    <a:lstStyle/>
+                    <a:p>
+                      <a:pPr marL="0" marR="0" lvl="0" indent="0" algn="ctr" defTabSz="914400" rtl="0" eaLnBrk="1" fontAlgn="auto" latinLnBrk="0" hangingPunct="1">
+                        <a:lnSpc>
+                          <a:spcPct val="100000"/>
+                        </a:lnSpc>
+                        <a:spcBef>
+                          <a:spcPts val="0"/>
+                        </a:spcBef>
+                        <a:spcAft>
+                          <a:spcPts val="0"/>
+                        </a:spcAft>
+                        <a:buClrTx/>
+                        <a:buSzTx/>
+                        <a:buFont typeface="Arial" panose="020B0604020202020204" pitchFamily="34" charset="0"/>
+                        <a:buNone/>
+                        <a:tabLst/>
+                        <a:defRPr/>
+                      </a:pPr>
+                      <a:r>
+                        <a:rPr lang="en-US" dirty="0">
+                          <a:latin typeface="Helvetica" pitchFamily="2" charset="0"/>
+                        </a:rPr>
+                        <a:t>Std. dev. inference time (n = 2000)</a:t>
+                      </a:r>
+                    </a:p>
+                  </a:txBody>
+                  <a:tcPr anchor="ctr"/>
+                </a:tc>
+                <a:tc>
+                  <a:txBody>
+                    <a:bodyPr/>
+                    <a:lstStyle/>
+                    <a:p>
+                      <a:pPr marL="0" marR="0" lvl="0" indent="0" algn="ctr" defTabSz="914400" rtl="0" eaLnBrk="1" fontAlgn="auto" latinLnBrk="0" hangingPunct="1">
+                        <a:lnSpc>
+                          <a:spcPct val="100000"/>
+                        </a:lnSpc>
+                        <a:spcBef>
+                          <a:spcPts val="0"/>
+                        </a:spcBef>
+                        <a:spcAft>
+                          <a:spcPts val="0"/>
+                        </a:spcAft>
+                        <a:buClrTx/>
+                        <a:buSzTx/>
+                        <a:buFont typeface="Arial" panose="020B0604020202020204" pitchFamily="34" charset="0"/>
+                        <a:buNone/>
+                        <a:tabLst/>
+                        <a:defRPr/>
+                      </a:pPr>
+                      <a:r>
+                        <a:rPr lang="en-US" dirty="0">
+                          <a:latin typeface="Helvetica" pitchFamily="2" charset="0"/>
+                        </a:rPr>
+                        <a:t>0.038ms</a:t>
+                      </a:r>
+                    </a:p>
+                  </a:txBody>
+                  <a:tcPr anchor="ctr"/>
+                </a:tc>
+                <a:tc>
+                  <a:txBody>
+                    <a:bodyPr/>
+                    <a:lstStyle/>
+                    <a:p>
+                      <a:pPr marL="0" marR="0" lvl="0" indent="0" algn="ctr" defTabSz="914400" rtl="0" eaLnBrk="1" fontAlgn="auto" latinLnBrk="0" hangingPunct="1">
+                        <a:lnSpc>
+                          <a:spcPct val="100000"/>
+                        </a:lnSpc>
+                        <a:spcBef>
+                          <a:spcPts val="0"/>
+                        </a:spcBef>
+                        <a:spcAft>
+                          <a:spcPts val="0"/>
+                        </a:spcAft>
+                        <a:buClrTx/>
+                        <a:buSzTx/>
+                        <a:buFont typeface="Arial" panose="020B0604020202020204" pitchFamily="34" charset="0"/>
+                        <a:buNone/>
+                        <a:tabLst/>
+                        <a:defRPr/>
+                      </a:pPr>
+                      <a:r>
+                        <a:rPr lang="en-US" dirty="0">
+                          <a:latin typeface="Helvetica" pitchFamily="2" charset="0"/>
+                        </a:rPr>
+                        <a:t>0.154ms</a:t>
+                      </a:r>
+                    </a:p>
+                  </a:txBody>
+                  <a:tcPr anchor="ctr"/>
+                </a:tc>
+                <a:extLst>
+                  <a:ext uri="{0D108BD9-81ED-4DB2-BD59-A6C34878D82A}">
+                    <a16:rowId xmlns:a16="http://schemas.microsoft.com/office/drawing/2014/main" val="2549929292"/>
+                  </a:ext>
+                </a:extLst>
+              </a:tr>
+            </a:tbl>
+          </a:graphicData>
+        </a:graphic>
+      </p:graphicFrame>
+      <p:pic>
+        <p:nvPicPr>
+          <p:cNvPr id="1026" name="Picture 2" descr="Zining Zhu">
+            <a:extLst>
+              <a:ext uri="{FF2B5EF4-FFF2-40B4-BE49-F238E27FC236}">
+                <a16:creationId xmlns:a16="http://schemas.microsoft.com/office/drawing/2014/main" id="{BC52CB5A-42B4-64D3-295A-FC714BC30921}"/>
+              </a:ext>
+            </a:extLst>
+          </p:cNvPr>
+          <p:cNvPicPr>
+            <a:picLocks noChangeAspect="1" noChangeArrowheads="1"/>
+          </p:cNvPicPr>
+          <p:nvPr/>
+        </p:nvPicPr>
+        <p:blipFill rotWithShape="1">
+          <a:blip r:embed="rId2">
+            <a:extLst>
+              <a:ext uri="{28A0092B-C50C-407E-A947-70E740481C1C}">
+                <a14:useLocalDpi xmlns:a14="http://schemas.microsoft.com/office/drawing/2010/main" val="0"/>
+              </a:ext>
+            </a:extLst>
+          </a:blip>
+          <a:srcRect l="18522" r="17200"/>
+          <a:stretch/>
+        </p:blipFill>
+        <p:spPr bwMode="auto">
+          <a:xfrm>
+            <a:off x="-25052" y="5546784"/>
+            <a:ext cx="826718" cy="1286164"/>
+          </a:xfrm>
+          <a:prstGeom prst="rect">
+            <a:avLst/>
+          </a:prstGeom>
+          <a:noFill/>
+          <a:extLst>
+            <a:ext uri="{909E8E84-426E-40DD-AFC4-6F175D3DCCD1}">
+              <a14:hiddenFill xmlns:a14="http://schemas.microsoft.com/office/drawing/2010/main">
+                <a:solidFill>
+                  <a:srgbClr val="FFFFFF"/>
+                </a:solidFill>
+              </a14:hiddenFill>
+            </a:ext>
+          </a:extLst>
+        </p:spPr>
+      </p:pic>
+      <p:sp>
+        <p:nvSpPr>
+          <p:cNvPr id="5" name="TextBox 4">
+            <a:extLst>
+              <a:ext uri="{FF2B5EF4-FFF2-40B4-BE49-F238E27FC236}">
+                <a16:creationId xmlns:a16="http://schemas.microsoft.com/office/drawing/2014/main" id="{CB4D48AD-F551-6F65-4752-814BAC46454C}"/>
+              </a:ext>
+            </a:extLst>
+          </p:cNvPr>
+          <p:cNvSpPr txBox="1"/>
+          <p:nvPr/>
+        </p:nvSpPr>
+        <p:spPr>
+          <a:xfrm>
+            <a:off x="0" y="1"/>
+            <a:ext cx="4488874" cy="584775"/>
+          </a:xfrm>
+          <a:prstGeom prst="rect">
+            <a:avLst/>
+          </a:prstGeom>
+          <a:noFill/>
+        </p:spPr>
+        <p:txBody>
+          <a:bodyPr wrap="square" rtlCol="0">
+            <a:spAutoFit/>
+          </a:bodyPr>
+          <a:lstStyle/>
+          <a:p>
+            <a:r>
+              <a:rPr lang="en-US" sz="3200" dirty="0">
+                <a:latin typeface="Helvetica" pitchFamily="2" charset="0"/>
+                <a:cs typeface="Arial" panose="020B0604020202020204" pitchFamily="34" charset="0"/>
+              </a:rPr>
+              <a:t>Week of Dec. 18, 2023</a:t>
+            </a:r>
+          </a:p>
+        </p:txBody>
+      </p:sp>
+      <p:sp>
+        <p:nvSpPr>
+          <p:cNvPr id="6" name="TextBox 5">
+            <a:extLst>
+              <a:ext uri="{FF2B5EF4-FFF2-40B4-BE49-F238E27FC236}">
+                <a16:creationId xmlns:a16="http://schemas.microsoft.com/office/drawing/2014/main" id="{FB8E6533-2D9E-0107-FF29-E2E7D1F8FCCB}"/>
+              </a:ext>
+            </a:extLst>
+          </p:cNvPr>
+          <p:cNvSpPr txBox="1"/>
+          <p:nvPr/>
+        </p:nvSpPr>
+        <p:spPr>
+          <a:xfrm>
+            <a:off x="555171" y="940273"/>
+            <a:ext cx="10317421" cy="707886"/>
+          </a:xfrm>
+          <a:prstGeom prst="rect">
+            <a:avLst/>
+          </a:prstGeom>
+          <a:noFill/>
+        </p:spPr>
+        <p:txBody>
+          <a:bodyPr wrap="square" rtlCol="0">
+            <a:spAutoFit/>
+          </a:bodyPr>
+          <a:lstStyle/>
+          <a:p>
+            <a:pPr marL="285750" indent="-285750">
+              <a:buFont typeface="Arial" panose="020B0604020202020204" pitchFamily="34" charset="0"/>
+              <a:buChar char="•"/>
+            </a:pPr>
+            <a:r>
+              <a:rPr lang="en-US" sz="2000" dirty="0">
+                <a:latin typeface="Helvetica" pitchFamily="2" charset="0"/>
+              </a:rPr>
+              <a:t>Got Coral USB Edge Accelerator to run model</a:t>
+            </a:r>
+          </a:p>
+          <a:p>
+            <a:pPr marL="285750" indent="-285750">
+              <a:buFont typeface="Arial" panose="020B0604020202020204" pitchFamily="34" charset="0"/>
+              <a:buChar char="•"/>
+            </a:pPr>
+            <a:r>
+              <a:rPr lang="en-US" sz="2000" dirty="0">
+                <a:latin typeface="Helvetica" pitchFamily="2" charset="0"/>
+                <a:sym typeface="Wingdings" pitchFamily="2" charset="2"/>
+              </a:rPr>
+              <a:t>Compared output w/ </a:t>
+            </a:r>
+            <a:r>
+              <a:rPr lang="en-US" sz="2000" dirty="0" err="1">
+                <a:latin typeface="Helvetica" pitchFamily="2" charset="0"/>
+                <a:sym typeface="Wingdings" pitchFamily="2" charset="2"/>
+              </a:rPr>
+              <a:t>Tensorflow</a:t>
+            </a:r>
+            <a:r>
+              <a:rPr lang="en-US" sz="2000" dirty="0">
+                <a:latin typeface="Helvetica" pitchFamily="2" charset="0"/>
+                <a:sym typeface="Wingdings" pitchFamily="2" charset="2"/>
+              </a:rPr>
+              <a:t> model on CPU for exactness</a:t>
+            </a:r>
+          </a:p>
+        </p:txBody>
+      </p:sp>
+      <p:sp>
+        <p:nvSpPr>
+          <p:cNvPr id="7" name="TextBox 6">
+            <a:extLst>
+              <a:ext uri="{FF2B5EF4-FFF2-40B4-BE49-F238E27FC236}">
+                <a16:creationId xmlns:a16="http://schemas.microsoft.com/office/drawing/2014/main" id="{739178B1-CA7A-5DF8-EE34-66AABD65585F}"/>
+              </a:ext>
+            </a:extLst>
+          </p:cNvPr>
+          <p:cNvSpPr txBox="1"/>
+          <p:nvPr/>
+        </p:nvSpPr>
+        <p:spPr>
+          <a:xfrm>
+            <a:off x="663880" y="6417450"/>
+            <a:ext cx="11390334" cy="415498"/>
+          </a:xfrm>
+          <a:prstGeom prst="rect">
+            <a:avLst/>
+          </a:prstGeom>
+          <a:noFill/>
+        </p:spPr>
+        <p:txBody>
+          <a:bodyPr wrap="square" rtlCol="0">
+            <a:spAutoFit/>
+          </a:bodyPr>
+          <a:lstStyle/>
+          <a:p>
+            <a:r>
+              <a:rPr lang="en-US" sz="2100" b="1" dirty="0" err="1">
+                <a:solidFill>
+                  <a:schemeClr val="bg2">
+                    <a:lumMod val="90000"/>
+                  </a:schemeClr>
+                </a:solidFill>
+                <a:latin typeface="Helvetica" pitchFamily="2" charset="0"/>
+                <a:cs typeface="Arial" panose="020B0604020202020204" pitchFamily="34" charset="0"/>
+              </a:rPr>
+              <a:t>EngSci</a:t>
+            </a:r>
+            <a:r>
+              <a:rPr lang="en-US" sz="2100" b="1" dirty="0">
+                <a:solidFill>
+                  <a:schemeClr val="bg2">
+                    <a:lumMod val="90000"/>
+                  </a:schemeClr>
+                </a:solidFill>
+                <a:latin typeface="Helvetica" pitchFamily="2" charset="0"/>
+                <a:cs typeface="Arial" panose="020B0604020202020204" pitchFamily="34" charset="0"/>
+              </a:rPr>
+              <a:t> thesis: Sleep stage classification AI model design and FPGA implementation</a:t>
+            </a:r>
+          </a:p>
+        </p:txBody>
+      </p:sp>
+      <p:sp>
+        <p:nvSpPr>
+          <p:cNvPr id="2" name="TextBox 1">
+            <a:extLst>
+              <a:ext uri="{FF2B5EF4-FFF2-40B4-BE49-F238E27FC236}">
+                <a16:creationId xmlns:a16="http://schemas.microsoft.com/office/drawing/2014/main" id="{D472E486-EED5-8202-6306-34599C8A4654}"/>
+              </a:ext>
+            </a:extLst>
+          </p:cNvPr>
+          <p:cNvSpPr txBox="1"/>
+          <p:nvPr/>
+        </p:nvSpPr>
+        <p:spPr>
+          <a:xfrm>
+            <a:off x="555171" y="3566680"/>
+            <a:ext cx="6104247" cy="369332"/>
+          </a:xfrm>
+          <a:prstGeom prst="rect">
+            <a:avLst/>
+          </a:prstGeom>
+          <a:noFill/>
+        </p:spPr>
+        <p:txBody>
+          <a:bodyPr wrap="square" rtlCol="0">
+            <a:spAutoFit/>
+          </a:bodyPr>
+          <a:lstStyle/>
+          <a:p>
+            <a:r>
+              <a:rPr lang="en-US" dirty="0"/>
+              <a:t>*Inference on 30s clip (float32, 256Hz sampling, single-channel)</a:t>
+            </a:r>
+          </a:p>
+        </p:txBody>
+      </p:sp>
+    </p:spTree>
+    <p:extLst>
+      <p:ext uri="{BB962C8B-B14F-4D97-AF65-F5344CB8AC3E}">
+        <p14:creationId xmlns:p14="http://schemas.microsoft.com/office/powerpoint/2010/main" val="3363086102"/>
       </p:ext>
     </p:extLst>
   </p:cSld>

</xml_diff>

<commit_message>
Removed references to having two encoders (since it's higher accuracy and smaller size to have a single one
</commit_message>
<xml_diff>
--- a/weekly_progress.pptx
+++ b/weekly_progress.pptx
@@ -5,12 +5,13 @@
     <p:sldMasterId id="2147483648" r:id="rId1"/>
   </p:sldMasterIdLst>
   <p:notesMasterIdLst>
-    <p:notesMasterId r:id="rId5"/>
+    <p:notesMasterId r:id="rId6"/>
   </p:notesMasterIdLst>
   <p:sldIdLst>
     <p:sldId id="256" r:id="rId2"/>
     <p:sldId id="257" r:id="rId3"/>
     <p:sldId id="258" r:id="rId4"/>
+    <p:sldId id="259" r:id="rId5"/>
   </p:sldIdLst>
   <p:sldSz cx="12192000" cy="6858000"/>
   <p:notesSz cx="6858000" cy="9144000"/>
@@ -199,7 +200,7 @@
           <a:p>
             <a:fld id="{BF3B6487-623F-5144-817D-0678D4F16A76}" type="datetimeFigureOut">
               <a:rPr lang="en-US" smtClean="0"/>
-              <a:t>12/21/23</a:t>
+              <a:t>2/1/24</a:t>
             </a:fld>
             <a:endParaRPr lang="en-US"/>
           </a:p>
@@ -550,6 +551,93 @@
 </p:notes>
 </file>
 
+<file path=ppt/notesSlides/notesSlide2.xml><?xml version="1.0" encoding="utf-8"?>
+<p:notes xmlns:a="http://schemas.openxmlformats.org/drawingml/2006/main" xmlns:r="http://schemas.openxmlformats.org/officeDocument/2006/relationships" xmlns:p="http://schemas.openxmlformats.org/presentationml/2006/main">
+  <p:cSld>
+    <p:spTree>
+      <p:nvGrpSpPr>
+        <p:cNvPr id="1" name=""/>
+        <p:cNvGrpSpPr/>
+        <p:nvPr/>
+      </p:nvGrpSpPr>
+      <p:grpSpPr>
+        <a:xfrm>
+          <a:off x="0" y="0"/>
+          <a:ext cx="0" cy="0"/>
+          <a:chOff x="0" y="0"/>
+          <a:chExt cx="0" cy="0"/>
+        </a:xfrm>
+      </p:grpSpPr>
+      <p:sp>
+        <p:nvSpPr>
+          <p:cNvPr id="2" name="Slide Image Placeholder 1"/>
+          <p:cNvSpPr>
+            <a:spLocks noGrp="1" noRot="1" noChangeAspect="1"/>
+          </p:cNvSpPr>
+          <p:nvPr>
+            <p:ph type="sldImg"/>
+          </p:nvPr>
+        </p:nvSpPr>
+        <p:spPr/>
+      </p:sp>
+      <p:sp>
+        <p:nvSpPr>
+          <p:cNvPr id="3" name="Notes Placeholder 2"/>
+          <p:cNvSpPr>
+            <a:spLocks noGrp="1"/>
+          </p:cNvSpPr>
+          <p:nvPr>
+            <p:ph type="body" idx="1"/>
+          </p:nvPr>
+        </p:nvSpPr>
+        <p:spPr/>
+        <p:txBody>
+          <a:bodyPr/>
+          <a:lstStyle/>
+          <a:p>
+            <a:r>
+              <a:rPr lang="en-US" dirty="0"/>
+              <a:t>What area can I have?</a:t>
+            </a:r>
+          </a:p>
+        </p:txBody>
+      </p:sp>
+      <p:sp>
+        <p:nvSpPr>
+          <p:cNvPr id="4" name="Slide Number Placeholder 3"/>
+          <p:cNvSpPr>
+            <a:spLocks noGrp="1"/>
+          </p:cNvSpPr>
+          <p:nvPr>
+            <p:ph type="sldNum" sz="quarter" idx="5"/>
+          </p:nvPr>
+        </p:nvSpPr>
+        <p:spPr/>
+        <p:txBody>
+          <a:bodyPr/>
+          <a:lstStyle/>
+          <a:p>
+            <a:fld id="{F6742F82-CB19-C049-A5F4-AD80AE78FAF2}" type="slidenum">
+              <a:rPr lang="en-US" smtClean="0"/>
+              <a:t>4</a:t>
+            </a:fld>
+            <a:endParaRPr lang="en-US"/>
+          </a:p>
+        </p:txBody>
+      </p:sp>
+    </p:spTree>
+    <p:extLst>
+      <p:ext uri="{BB962C8B-B14F-4D97-AF65-F5344CB8AC3E}">
+        <p14:creationId xmlns:p14="http://schemas.microsoft.com/office/powerpoint/2010/main" val="3540168526"/>
+      </p:ext>
+    </p:extLst>
+  </p:cSld>
+  <p:clrMapOvr>
+    <a:masterClrMapping/>
+  </p:clrMapOvr>
+</p:notes>
+</file>
+
 <file path=ppt/slideLayouts/slideLayout1.xml><?xml version="1.0" encoding="utf-8"?>
 <p:sldLayout xmlns:a="http://schemas.openxmlformats.org/drawingml/2006/main" xmlns:r="http://schemas.openxmlformats.org/officeDocument/2006/relationships" xmlns:p="http://schemas.openxmlformats.org/presentationml/2006/main" type="title" preserve="1">
   <p:cSld name="Title Slide">
@@ -697,7 +785,7 @@
           <a:p>
             <a:fld id="{AB4363F0-2783-884A-9F1E-911F086597B5}" type="datetimeFigureOut">
               <a:rPr lang="en-US" smtClean="0"/>
-              <a:t>12/21/23</a:t>
+              <a:t>2/1/24</a:t>
             </a:fld>
             <a:endParaRPr lang="en-US"/>
           </a:p>
@@ -895,7 +983,7 @@
           <a:p>
             <a:fld id="{AB4363F0-2783-884A-9F1E-911F086597B5}" type="datetimeFigureOut">
               <a:rPr lang="en-US" smtClean="0"/>
-              <a:t>12/21/23</a:t>
+              <a:t>2/1/24</a:t>
             </a:fld>
             <a:endParaRPr lang="en-US"/>
           </a:p>
@@ -1103,7 +1191,7 @@
           <a:p>
             <a:fld id="{AB4363F0-2783-884A-9F1E-911F086597B5}" type="datetimeFigureOut">
               <a:rPr lang="en-US" smtClean="0"/>
-              <a:t>12/21/23</a:t>
+              <a:t>2/1/24</a:t>
             </a:fld>
             <a:endParaRPr lang="en-US"/>
           </a:p>
@@ -1301,7 +1389,7 @@
           <a:p>
             <a:fld id="{AB4363F0-2783-884A-9F1E-911F086597B5}" type="datetimeFigureOut">
               <a:rPr lang="en-US" smtClean="0"/>
-              <a:t>12/21/23</a:t>
+              <a:t>2/1/24</a:t>
             </a:fld>
             <a:endParaRPr lang="en-US"/>
           </a:p>
@@ -1576,7 +1664,7 @@
           <a:p>
             <a:fld id="{AB4363F0-2783-884A-9F1E-911F086597B5}" type="datetimeFigureOut">
               <a:rPr lang="en-US" smtClean="0"/>
-              <a:t>12/21/23</a:t>
+              <a:t>2/1/24</a:t>
             </a:fld>
             <a:endParaRPr lang="en-US"/>
           </a:p>
@@ -1841,7 +1929,7 @@
           <a:p>
             <a:fld id="{AB4363F0-2783-884A-9F1E-911F086597B5}" type="datetimeFigureOut">
               <a:rPr lang="en-US" smtClean="0"/>
-              <a:t>12/21/23</a:t>
+              <a:t>2/1/24</a:t>
             </a:fld>
             <a:endParaRPr lang="en-US"/>
           </a:p>
@@ -2253,7 +2341,7 @@
           <a:p>
             <a:fld id="{AB4363F0-2783-884A-9F1E-911F086597B5}" type="datetimeFigureOut">
               <a:rPr lang="en-US" smtClean="0"/>
-              <a:t>12/21/23</a:t>
+              <a:t>2/1/24</a:t>
             </a:fld>
             <a:endParaRPr lang="en-US"/>
           </a:p>
@@ -2394,7 +2482,7 @@
           <a:p>
             <a:fld id="{AB4363F0-2783-884A-9F1E-911F086597B5}" type="datetimeFigureOut">
               <a:rPr lang="en-US" smtClean="0"/>
-              <a:t>12/21/23</a:t>
+              <a:t>2/1/24</a:t>
             </a:fld>
             <a:endParaRPr lang="en-US"/>
           </a:p>
@@ -2507,7 +2595,7 @@
           <a:p>
             <a:fld id="{AB4363F0-2783-884A-9F1E-911F086597B5}" type="datetimeFigureOut">
               <a:rPr lang="en-US" smtClean="0"/>
-              <a:t>12/21/23</a:t>
+              <a:t>2/1/24</a:t>
             </a:fld>
             <a:endParaRPr lang="en-US"/>
           </a:p>
@@ -2818,7 +2906,7 @@
           <a:p>
             <a:fld id="{AB4363F0-2783-884A-9F1E-911F086597B5}" type="datetimeFigureOut">
               <a:rPr lang="en-US" smtClean="0"/>
-              <a:t>12/21/23</a:t>
+              <a:t>2/1/24</a:t>
             </a:fld>
             <a:endParaRPr lang="en-US"/>
           </a:p>
@@ -3106,7 +3194,7 @@
           <a:p>
             <a:fld id="{AB4363F0-2783-884A-9F1E-911F086597B5}" type="datetimeFigureOut">
               <a:rPr lang="en-US" smtClean="0"/>
-              <a:t>12/21/23</a:t>
+              <a:t>2/1/24</a:t>
             </a:fld>
             <a:endParaRPr lang="en-US"/>
           </a:p>
@@ -3347,7 +3435,7 @@
           <a:p>
             <a:fld id="{AB4363F0-2783-884A-9F1E-911F086597B5}" type="datetimeFigureOut">
               <a:rPr lang="en-US" smtClean="0"/>
-              <a:t>12/21/23</a:t>
+              <a:t>2/1/24</a:t>
             </a:fld>
             <a:endParaRPr lang="en-US"/>
           </a:p>
@@ -3917,7 +4005,7 @@
                 <a:latin typeface="Helvetica" pitchFamily="2" charset="0"/>
                 <a:cs typeface="Arial" panose="020B0604020202020204" pitchFamily="34" charset="0"/>
               </a:rPr>
-              <a:t>Sleep stage classification AI model design and FPGA implementation</a:t>
+              <a:t>Sleep staging AI model design and ASIC implementation</a:t>
             </a:r>
             <a:br>
               <a:rPr lang="en-US" sz="3500" dirty="0">
@@ -4602,7 +4690,7 @@
                 <a:latin typeface="Helvetica" pitchFamily="2" charset="0"/>
                 <a:cs typeface="Arial" panose="020B0604020202020204" pitchFamily="34" charset="0"/>
               </a:rPr>
-              <a:t> thesis: Sleep stage classification AI model design and FPGA implementation</a:t>
+              <a:t> thesis: Sleep staging AI model design and ASIC implementation</a:t>
             </a:r>
           </a:p>
         </p:txBody>
@@ -5143,7 +5231,7 @@
                 <a:latin typeface="Helvetica" pitchFamily="2" charset="0"/>
                 <a:cs typeface="Arial" panose="020B0604020202020204" pitchFamily="34" charset="0"/>
               </a:rPr>
-              <a:t> thesis: Sleep stage classification AI model design and FPGA implementation</a:t>
+              <a:t> thesis: Sleep staging AI model design and ASIC implementation</a:t>
             </a:r>
           </a:p>
         </p:txBody>
@@ -5187,6 +5275,375 @@
     <p:extLst>
       <p:ext uri="{BB962C8B-B14F-4D97-AF65-F5344CB8AC3E}">
         <p14:creationId xmlns:p14="http://schemas.microsoft.com/office/powerpoint/2010/main" val="3363086102"/>
+      </p:ext>
+    </p:extLst>
+  </p:cSld>
+  <p:clrMapOvr>
+    <a:masterClrMapping/>
+  </p:clrMapOvr>
+</p:sld>
+</file>
+
+<file path=ppt/slides/slide4.xml><?xml version="1.0" encoding="utf-8"?>
+<p:sld xmlns:a="http://schemas.openxmlformats.org/drawingml/2006/main" xmlns:r="http://schemas.openxmlformats.org/officeDocument/2006/relationships" xmlns:p="http://schemas.openxmlformats.org/presentationml/2006/main">
+  <p:cSld>
+    <p:spTree>
+      <p:nvGrpSpPr>
+        <p:cNvPr id="1" name=""/>
+        <p:cNvGrpSpPr/>
+        <p:nvPr/>
+      </p:nvGrpSpPr>
+      <p:grpSpPr>
+        <a:xfrm>
+          <a:off x="0" y="0"/>
+          <a:ext cx="0" cy="0"/>
+          <a:chOff x="0" y="0"/>
+          <a:chExt cx="0" cy="0"/>
+        </a:xfrm>
+      </p:grpSpPr>
+      <p:pic>
+        <p:nvPicPr>
+          <p:cNvPr id="8" name="Picture 7" descr="A diagram of a computer data flow&#10;&#10;Description automatically generated">
+            <a:extLst>
+              <a:ext uri="{FF2B5EF4-FFF2-40B4-BE49-F238E27FC236}">
+                <a16:creationId xmlns:a16="http://schemas.microsoft.com/office/drawing/2014/main" id="{97B7B615-A4F0-47E4-2CC9-829B98F10C09}"/>
+              </a:ext>
+            </a:extLst>
+          </p:cNvPr>
+          <p:cNvPicPr>
+            <a:picLocks noChangeAspect="1"/>
+          </p:cNvPicPr>
+          <p:nvPr/>
+        </p:nvPicPr>
+        <p:blipFill>
+          <a:blip r:embed="rId3"/>
+          <a:stretch>
+            <a:fillRect/>
+          </a:stretch>
+        </p:blipFill>
+        <p:spPr>
+          <a:xfrm>
+            <a:off x="7611877" y="1755730"/>
+            <a:ext cx="4442337" cy="3991665"/>
+          </a:xfrm>
+          <a:prstGeom prst="rect">
+            <a:avLst/>
+          </a:prstGeom>
+        </p:spPr>
+      </p:pic>
+      <p:pic>
+        <p:nvPicPr>
+          <p:cNvPr id="1026" name="Picture 2" descr="Zining Zhu">
+            <a:extLst>
+              <a:ext uri="{FF2B5EF4-FFF2-40B4-BE49-F238E27FC236}">
+                <a16:creationId xmlns:a16="http://schemas.microsoft.com/office/drawing/2014/main" id="{BC52CB5A-42B4-64D3-295A-FC714BC30921}"/>
+              </a:ext>
+            </a:extLst>
+          </p:cNvPr>
+          <p:cNvPicPr>
+            <a:picLocks noChangeAspect="1" noChangeArrowheads="1"/>
+          </p:cNvPicPr>
+          <p:nvPr/>
+        </p:nvPicPr>
+        <p:blipFill rotWithShape="1">
+          <a:blip r:embed="rId4">
+            <a:extLst>
+              <a:ext uri="{28A0092B-C50C-407E-A947-70E740481C1C}">
+                <a14:useLocalDpi xmlns:a14="http://schemas.microsoft.com/office/drawing/2010/main" val="0"/>
+              </a:ext>
+            </a:extLst>
+          </a:blip>
+          <a:srcRect l="18522" r="17200"/>
+          <a:stretch/>
+        </p:blipFill>
+        <p:spPr bwMode="auto">
+          <a:xfrm>
+            <a:off x="-25052" y="5546784"/>
+            <a:ext cx="826718" cy="1286164"/>
+          </a:xfrm>
+          <a:prstGeom prst="rect">
+            <a:avLst/>
+          </a:prstGeom>
+          <a:noFill/>
+          <a:extLst>
+            <a:ext uri="{909E8E84-426E-40DD-AFC4-6F175D3DCCD1}">
+              <a14:hiddenFill xmlns:a14="http://schemas.microsoft.com/office/drawing/2010/main">
+                <a:solidFill>
+                  <a:srgbClr val="FFFFFF"/>
+                </a:solidFill>
+              </a14:hiddenFill>
+            </a:ext>
+          </a:extLst>
+        </p:spPr>
+      </p:pic>
+      <p:sp>
+        <p:nvSpPr>
+          <p:cNvPr id="6" name="TextBox 5">
+            <a:extLst>
+              <a:ext uri="{FF2B5EF4-FFF2-40B4-BE49-F238E27FC236}">
+                <a16:creationId xmlns:a16="http://schemas.microsoft.com/office/drawing/2014/main" id="{FB8E6533-2D9E-0107-FF29-E2E7D1F8FCCB}"/>
+              </a:ext>
+            </a:extLst>
+          </p:cNvPr>
+          <p:cNvSpPr txBox="1"/>
+          <p:nvPr/>
+        </p:nvSpPr>
+        <p:spPr>
+          <a:xfrm>
+            <a:off x="555172" y="940273"/>
+            <a:ext cx="7979228" cy="5125955"/>
+          </a:xfrm>
+          <a:prstGeom prst="rect">
+            <a:avLst/>
+          </a:prstGeom>
+          <a:noFill/>
+        </p:spPr>
+        <p:txBody>
+          <a:bodyPr wrap="square" rtlCol="0">
+            <a:spAutoFit/>
+          </a:bodyPr>
+          <a:lstStyle/>
+          <a:p>
+            <a:pPr marL="285750" indent="-285750">
+              <a:lnSpc>
+                <a:spcPct val="150000"/>
+              </a:lnSpc>
+              <a:buFont typeface="Arial" panose="020B0604020202020204" pitchFamily="34" charset="0"/>
+              <a:buChar char="•"/>
+            </a:pPr>
+            <a:r>
+              <a:rPr lang="en-US" sz="2000" dirty="0">
+                <a:latin typeface="Helvetica" pitchFamily="2" charset="0"/>
+                <a:sym typeface="Wingdings" pitchFamily="2" charset="2"/>
+              </a:rPr>
+              <a:t>Model finished: 82.3% @ 52k param. (but </a:t>
+            </a:r>
+            <a:r>
+              <a:rPr lang="en-US" sz="2000" dirty="0" err="1">
+                <a:latin typeface="Helvetica" pitchFamily="2" charset="0"/>
+                <a:sym typeface="Wingdings" pitchFamily="2" charset="2"/>
+              </a:rPr>
+              <a:t>hyperparam</a:t>
+            </a:r>
+            <a:r>
+              <a:rPr lang="en-US" sz="2000" dirty="0">
+                <a:latin typeface="Helvetica" pitchFamily="2" charset="0"/>
+                <a:sym typeface="Wingdings" pitchFamily="2" charset="2"/>
+              </a:rPr>
+              <a:t>. searching)</a:t>
+            </a:r>
+          </a:p>
+          <a:p>
+            <a:pPr marL="742950" lvl="1" indent="-285750">
+              <a:lnSpc>
+                <a:spcPct val="150000"/>
+              </a:lnSpc>
+              <a:buFont typeface="Arial" panose="020B0604020202020204" pitchFamily="34" charset="0"/>
+              <a:buChar char="•"/>
+            </a:pPr>
+            <a:r>
+              <a:rPr lang="en-US" sz="2000" dirty="0">
+                <a:latin typeface="Helvetica" pitchFamily="2" charset="0"/>
+                <a:sym typeface="Wingdings" pitchFamily="2" charset="2"/>
+              </a:rPr>
+              <a:t>15s @ 128Hz is also not too bad (80.8% @ 50k parameters)</a:t>
+            </a:r>
+          </a:p>
+          <a:p>
+            <a:pPr marL="285750" indent="-285750">
+              <a:lnSpc>
+                <a:spcPct val="150000"/>
+              </a:lnSpc>
+              <a:buFont typeface="Arial" panose="020B0604020202020204" pitchFamily="34" charset="0"/>
+              <a:buChar char="•"/>
+            </a:pPr>
+            <a:r>
+              <a:rPr lang="en-US" sz="2000" dirty="0">
+                <a:latin typeface="Helvetica" pitchFamily="2" charset="0"/>
+                <a:sym typeface="Wingdings" pitchFamily="2" charset="2"/>
+              </a:rPr>
+              <a:t>ASIC architecture finished</a:t>
+            </a:r>
+          </a:p>
+          <a:p>
+            <a:pPr marL="285750" indent="-285750">
+              <a:lnSpc>
+                <a:spcPct val="150000"/>
+              </a:lnSpc>
+              <a:buFont typeface="Arial" panose="020B0604020202020204" pitchFamily="34" charset="0"/>
+              <a:buChar char="•"/>
+            </a:pPr>
+            <a:r>
+              <a:rPr lang="en-US" sz="2000" dirty="0">
+                <a:latin typeface="Helvetica" pitchFamily="2" charset="0"/>
+                <a:sym typeface="Wingdings" pitchFamily="2" charset="2"/>
+              </a:rPr>
+              <a:t>Interim report submitted</a:t>
+            </a:r>
+          </a:p>
+          <a:p>
+            <a:pPr marL="285750" indent="-285750">
+              <a:lnSpc>
+                <a:spcPct val="150000"/>
+              </a:lnSpc>
+              <a:buFont typeface="Arial" panose="020B0604020202020204" pitchFamily="34" charset="0"/>
+              <a:buChar char="•"/>
+            </a:pPr>
+            <a:r>
+              <a:rPr lang="en-US" sz="2000" dirty="0">
+                <a:latin typeface="Helvetica" pitchFamily="2" charset="0"/>
+                <a:sym typeface="Wingdings" pitchFamily="2" charset="2"/>
+              </a:rPr>
+              <a:t>C++ model of ASIC in progress (~50% done)</a:t>
+            </a:r>
+          </a:p>
+          <a:p>
+            <a:pPr marL="285750" indent="-285750">
+              <a:lnSpc>
+                <a:spcPct val="150000"/>
+              </a:lnSpc>
+              <a:buFont typeface="Arial" panose="020B0604020202020204" pitchFamily="34" charset="0"/>
+              <a:buChar char="•"/>
+            </a:pPr>
+            <a:r>
+              <a:rPr lang="en-US" sz="2000" dirty="0">
+                <a:latin typeface="Helvetica" pitchFamily="2" charset="0"/>
+                <a:sym typeface="Wingdings" pitchFamily="2" charset="2"/>
+              </a:rPr>
+              <a:t>CMC access granted and synthesis flow works</a:t>
+            </a:r>
+          </a:p>
+          <a:p>
+            <a:pPr marL="285750" indent="-285750">
+              <a:lnSpc>
+                <a:spcPct val="150000"/>
+              </a:lnSpc>
+              <a:buFont typeface="Arial" panose="020B0604020202020204" pitchFamily="34" charset="0"/>
+              <a:buChar char="•"/>
+            </a:pPr>
+            <a:r>
+              <a:rPr lang="en-US" sz="2000" dirty="0" err="1">
+                <a:latin typeface="Helvetica" pitchFamily="2" charset="0"/>
+                <a:sym typeface="Wingdings" pitchFamily="2" charset="2"/>
+              </a:rPr>
+              <a:t>SleepEDF</a:t>
+            </a:r>
+            <a:r>
+              <a:rPr lang="en-US" sz="2000" dirty="0">
+                <a:latin typeface="Helvetica" pitchFamily="2" charset="0"/>
+                <a:sym typeface="Wingdings" pitchFamily="2" charset="2"/>
+              </a:rPr>
+              <a:t>-Expanded (downloaded in </a:t>
+            </a:r>
+            <a:r>
+              <a:rPr lang="en-US" sz="2000" dirty="0">
+                <a:latin typeface="Kohinoor Bangla" panose="02000000000000000000" pitchFamily="2" charset="77"/>
+                <a:cs typeface="Kohinoor Bangla" panose="02000000000000000000" pitchFamily="2" charset="77"/>
+                <a:sym typeface="Wingdings" pitchFamily="2" charset="2"/>
+              </a:rPr>
+              <a:t>data/</a:t>
+            </a:r>
+            <a:r>
+              <a:rPr lang="en-US" sz="2000" dirty="0">
+                <a:latin typeface="Helvetica" pitchFamily="2" charset="0"/>
+                <a:sym typeface="Wingdings" pitchFamily="2" charset="2"/>
+              </a:rPr>
+              <a:t>)</a:t>
+            </a:r>
+          </a:p>
+          <a:p>
+            <a:pPr marL="285750" indent="-285750">
+              <a:lnSpc>
+                <a:spcPct val="150000"/>
+              </a:lnSpc>
+              <a:buFont typeface="Arial" panose="020B0604020202020204" pitchFamily="34" charset="0"/>
+              <a:buChar char="•"/>
+            </a:pPr>
+            <a:r>
+              <a:rPr lang="en-US" sz="2000" dirty="0">
+                <a:latin typeface="Helvetica" pitchFamily="2" charset="0"/>
+                <a:sym typeface="Wingdings" pitchFamily="2" charset="2"/>
+              </a:rPr>
+              <a:t>Got access to STAGES (1500 patients, ~400GB) and SHHS (~10000 nights, ~350GB)</a:t>
+            </a:r>
+          </a:p>
+          <a:p>
+            <a:pPr marL="742950" lvl="1" indent="-285750">
+              <a:lnSpc>
+                <a:spcPct val="150000"/>
+              </a:lnSpc>
+              <a:buFont typeface="Arial" panose="020B0604020202020204" pitchFamily="34" charset="0"/>
+              <a:buChar char="•"/>
+            </a:pPr>
+            <a:r>
+              <a:rPr lang="en-US" sz="2000" dirty="0">
+                <a:latin typeface="Helvetica" pitchFamily="2" charset="0"/>
+                <a:sym typeface="Wingdings" pitchFamily="2" charset="2"/>
+              </a:rPr>
+              <a:t>Can download them but will need to request more storage (we have 1TB)</a:t>
+            </a:r>
+          </a:p>
+        </p:txBody>
+      </p:sp>
+      <p:sp>
+        <p:nvSpPr>
+          <p:cNvPr id="7" name="TextBox 6">
+            <a:extLst>
+              <a:ext uri="{FF2B5EF4-FFF2-40B4-BE49-F238E27FC236}">
+                <a16:creationId xmlns:a16="http://schemas.microsoft.com/office/drawing/2014/main" id="{739178B1-CA7A-5DF8-EE34-66AABD65585F}"/>
+              </a:ext>
+            </a:extLst>
+          </p:cNvPr>
+          <p:cNvSpPr txBox="1"/>
+          <p:nvPr/>
+        </p:nvSpPr>
+        <p:spPr>
+          <a:xfrm>
+            <a:off x="663880" y="6417450"/>
+            <a:ext cx="11390334" cy="415498"/>
+          </a:xfrm>
+          <a:prstGeom prst="rect">
+            <a:avLst/>
+          </a:prstGeom>
+          <a:noFill/>
+        </p:spPr>
+        <p:txBody>
+          <a:bodyPr wrap="square" rtlCol="0">
+            <a:spAutoFit/>
+          </a:bodyPr>
+          <a:lstStyle/>
+          <a:p>
+            <a:r>
+              <a:rPr lang="en-US" sz="2100" b="1" dirty="0" err="1">
+                <a:solidFill>
+                  <a:schemeClr val="bg2">
+                    <a:lumMod val="90000"/>
+                  </a:schemeClr>
+                </a:solidFill>
+                <a:latin typeface="Helvetica" pitchFamily="2" charset="0"/>
+                <a:cs typeface="Arial" panose="020B0604020202020204" pitchFamily="34" charset="0"/>
+              </a:rPr>
+              <a:t>EngSci</a:t>
+            </a:r>
+            <a:r>
+              <a:rPr lang="en-US" sz="2100" b="1" dirty="0">
+                <a:solidFill>
+                  <a:schemeClr val="bg2">
+                    <a:lumMod val="90000"/>
+                  </a:schemeClr>
+                </a:solidFill>
+                <a:latin typeface="Helvetica" pitchFamily="2" charset="0"/>
+                <a:cs typeface="Arial" panose="020B0604020202020204" pitchFamily="34" charset="0"/>
+              </a:rPr>
+              <a:t> thesis: Sleep staging AI model design and ASIC implementation</a:t>
+            </a:r>
+          </a:p>
+        </p:txBody>
+      </p:sp>
+    </p:spTree>
+    <p:extLst>
+      <p:ext uri="{BB962C8B-B14F-4D97-AF65-F5344CB8AC3E}">
+        <p14:creationId xmlns:p14="http://schemas.microsoft.com/office/powerpoint/2010/main" val="2910594803"/>
       </p:ext>
     </p:extLst>
   </p:cSld>

</xml_diff>